<commit_message>
Lecture 4 and Assignment 6
</commit_message>
<xml_diff>
--- a/Lectures/Lecture 4 - 20170911 Predicate Logic and Quantifiers.pptx
+++ b/Lectures/Lecture 4 - 20170911 Predicate Logic and Quantifiers.pptx
@@ -7,6 +7,11 @@
   <p:sldIdLst>
     <p:sldId id="256" r:id="rId2"/>
     <p:sldId id="257" r:id="rId3"/>
+    <p:sldId id="258" r:id="rId4"/>
+    <p:sldId id="259" r:id="rId5"/>
+    <p:sldId id="260" r:id="rId6"/>
+    <p:sldId id="261" r:id="rId7"/>
+    <p:sldId id="262" r:id="rId8"/>
   </p:sldIdLst>
   <p:sldSz cx="12192000" cy="6858000"/>
   <p:notesSz cx="6858000" cy="9144000"/>
@@ -105,7 +110,16 @@
       </a:defRPr>
     </a:lvl9pPr>
   </p:defaultTextStyle>
+  <p:extLst>
+    <p:ext uri="{EFAFB233-063F-42B5-8137-9DF3F51BA10A}">
+      <p15:sldGuideLst xmlns:p15="http://schemas.microsoft.com/office/powerpoint/2012/main"/>
+    </p:ext>
+  </p:extLst>
 </p:presentation>
+</file>
+
+<file path=ppt/revisionInfo.xml><?xml version="1.0" encoding="utf-8"?>
+<p1510:revInfo xmlns:a="http://schemas.openxmlformats.org/drawingml/2006/main" xmlns:r="http://schemas.openxmlformats.org/officeDocument/2006/relationships" xmlns:p1510="http://schemas.microsoft.com/office/powerpoint/2015/10/main"/>
 </file>
 
 <file path=ppt/slideLayouts/slideLayout1.xml><?xml version="1.0" encoding="utf-8"?>
@@ -165,7 +179,7 @@
           <a:noFill/>
           <a:extLst>
             <a:ext uri="{909E8E84-426E-40dd-AFC4-6F175D3DCCD1}">
-              <a14:hiddenFill xmlns:a14="http://schemas.microsoft.com/office/drawing/2010/main" xmlns="">
+              <a14:hiddenFill xmlns="" xmlns:a14="http://schemas.microsoft.com/office/drawing/2010/main">
                 <a:solidFill>
                   <a:srgbClr val="FFFFFF"/>
                 </a:solidFill>
@@ -224,7 +238,7 @@
             </a:ln>
             <a:extLst>
               <a:ext uri="{91240B29-F687-4f45-9708-019B960494DF}">
-                <a14:hiddenLine xmlns:a14="http://schemas.microsoft.com/office/drawing/2010/main" xmlns="" w="9525">
+                <a14:hiddenLine xmlns="" xmlns:a14="http://schemas.microsoft.com/office/drawing/2010/main" w="9525">
                   <a:solidFill>
                     <a:srgbClr val="000000"/>
                   </a:solidFill>
@@ -314,7 +328,7 @@
             </a:ln>
             <a:extLst>
               <a:ext uri="{91240B29-F687-4f45-9708-019B960494DF}">
-                <a14:hiddenLine xmlns:a14="http://schemas.microsoft.com/office/drawing/2010/main" xmlns="" w="9525">
+                <a14:hiddenLine xmlns="" xmlns:a14="http://schemas.microsoft.com/office/drawing/2010/main" w="9525">
                   <a:solidFill>
                     <a:srgbClr val="000000"/>
                   </a:solidFill>
@@ -404,7 +418,7 @@
             </a:ln>
             <a:extLst>
               <a:ext uri="{91240B29-F687-4f45-9708-019B960494DF}">
-                <a14:hiddenLine xmlns:a14="http://schemas.microsoft.com/office/drawing/2010/main" xmlns="" w="9525">
+                <a14:hiddenLine xmlns="" xmlns:a14="http://schemas.microsoft.com/office/drawing/2010/main" w="9525">
                   <a:solidFill>
                     <a:srgbClr val="000000"/>
                   </a:solidFill>
@@ -438,7 +452,7 @@
             </a:ln>
             <a:extLst>
               <a:ext uri="{91240B29-F687-4f45-9708-019B960494DF}">
-                <a14:hiddenLine xmlns:a14="http://schemas.microsoft.com/office/drawing/2010/main" xmlns="" w="9525">
+                <a14:hiddenLine xmlns="" xmlns:a14="http://schemas.microsoft.com/office/drawing/2010/main" w="9525">
                   <a:solidFill>
                     <a:srgbClr val="000000"/>
                   </a:solidFill>
@@ -528,7 +542,7 @@
             </a:ln>
             <a:extLst>
               <a:ext uri="{91240B29-F687-4f45-9708-019B960494DF}">
-                <a14:hiddenLine xmlns:a14="http://schemas.microsoft.com/office/drawing/2010/main" xmlns="" w="9525">
+                <a14:hiddenLine xmlns="" xmlns:a14="http://schemas.microsoft.com/office/drawing/2010/main" w="9525">
                   <a:solidFill>
                     <a:srgbClr val="000000"/>
                   </a:solidFill>
@@ -590,7 +604,7 @@
             </a:ln>
             <a:extLst>
               <a:ext uri="{91240B29-F687-4f45-9708-019B960494DF}">
-                <a14:hiddenLine xmlns:a14="http://schemas.microsoft.com/office/drawing/2010/main" xmlns="" w="9525">
+                <a14:hiddenLine xmlns="" xmlns:a14="http://schemas.microsoft.com/office/drawing/2010/main" w="9525">
                   <a:solidFill>
                     <a:srgbClr val="000000"/>
                   </a:solidFill>
@@ -652,7 +666,7 @@
             </a:ln>
             <a:extLst>
               <a:ext uri="{91240B29-F687-4f45-9708-019B960494DF}">
-                <a14:hiddenLine xmlns:a14="http://schemas.microsoft.com/office/drawing/2010/main" xmlns="" w="9525">
+                <a14:hiddenLine xmlns="" xmlns:a14="http://schemas.microsoft.com/office/drawing/2010/main" w="9525">
                   <a:solidFill>
                     <a:srgbClr val="000000"/>
                   </a:solidFill>
@@ -742,7 +756,7 @@
             </a:ln>
             <a:extLst>
               <a:ext uri="{91240B29-F687-4f45-9708-019B960494DF}">
-                <a14:hiddenLine xmlns:a14="http://schemas.microsoft.com/office/drawing/2010/main" xmlns="" w="9525">
+                <a14:hiddenLine xmlns="" xmlns:a14="http://schemas.microsoft.com/office/drawing/2010/main" w="9525">
                   <a:solidFill>
                     <a:srgbClr val="000000"/>
                   </a:solidFill>
@@ -804,7 +818,7 @@
             </a:ln>
             <a:extLst>
               <a:ext uri="{91240B29-F687-4f45-9708-019B960494DF}">
-                <a14:hiddenLine xmlns:a14="http://schemas.microsoft.com/office/drawing/2010/main" xmlns="" w="9525">
+                <a14:hiddenLine xmlns="" xmlns:a14="http://schemas.microsoft.com/office/drawing/2010/main" w="9525">
                   <a:solidFill>
                     <a:srgbClr val="000000"/>
                   </a:solidFill>
@@ -866,7 +880,7 @@
             </a:ln>
             <a:extLst>
               <a:ext uri="{91240B29-F687-4f45-9708-019B960494DF}">
-                <a14:hiddenLine xmlns:a14="http://schemas.microsoft.com/office/drawing/2010/main" xmlns="" w="9525">
+                <a14:hiddenLine xmlns="" xmlns:a14="http://schemas.microsoft.com/office/drawing/2010/main" w="9525">
                   <a:solidFill>
                     <a:srgbClr val="000000"/>
                   </a:solidFill>
@@ -956,7 +970,7 @@
             </a:ln>
             <a:extLst>
               <a:ext uri="{91240B29-F687-4f45-9708-019B960494DF}">
-                <a14:hiddenLine xmlns:a14="http://schemas.microsoft.com/office/drawing/2010/main" xmlns="" w="9525">
+                <a14:hiddenLine xmlns="" xmlns:a14="http://schemas.microsoft.com/office/drawing/2010/main" w="9525">
                   <a:solidFill>
                     <a:srgbClr val="000000"/>
                   </a:solidFill>
@@ -1046,7 +1060,7 @@
             </a:ln>
             <a:extLst>
               <a:ext uri="{91240B29-F687-4f45-9708-019B960494DF}">
-                <a14:hiddenLine xmlns:a14="http://schemas.microsoft.com/office/drawing/2010/main" xmlns="" w="9525">
+                <a14:hiddenLine xmlns="" xmlns:a14="http://schemas.microsoft.com/office/drawing/2010/main" w="9525">
                   <a:solidFill>
                     <a:srgbClr val="000000"/>
                   </a:solidFill>
@@ -1108,7 +1122,7 @@
             </a:ln>
             <a:extLst>
               <a:ext uri="{91240B29-F687-4f45-9708-019B960494DF}">
-                <a14:hiddenLine xmlns:a14="http://schemas.microsoft.com/office/drawing/2010/main" xmlns="" w="9525">
+                <a14:hiddenLine xmlns="" xmlns:a14="http://schemas.microsoft.com/office/drawing/2010/main" w="9525">
                   <a:solidFill>
                     <a:srgbClr val="000000"/>
                   </a:solidFill>
@@ -1218,7 +1232,7 @@
             </a:ln>
             <a:extLst>
               <a:ext uri="{91240B29-F687-4f45-9708-019B960494DF}">
-                <a14:hiddenLine xmlns:a14="http://schemas.microsoft.com/office/drawing/2010/main" xmlns="" w="9525">
+                <a14:hiddenLine xmlns="" xmlns:a14="http://schemas.microsoft.com/office/drawing/2010/main" w="9525">
                   <a:solidFill>
                     <a:srgbClr val="000000"/>
                   </a:solidFill>
@@ -1280,7 +1294,7 @@
             </a:ln>
             <a:extLst>
               <a:ext uri="{91240B29-F687-4f45-9708-019B960494DF}">
-                <a14:hiddenLine xmlns:a14="http://schemas.microsoft.com/office/drawing/2010/main" xmlns="" w="9525">
+                <a14:hiddenLine xmlns="" xmlns:a14="http://schemas.microsoft.com/office/drawing/2010/main" w="9525">
                   <a:solidFill>
                     <a:srgbClr val="000000"/>
                   </a:solidFill>
@@ -1370,7 +1384,7 @@
             </a:ln>
             <a:extLst>
               <a:ext uri="{91240B29-F687-4f45-9708-019B960494DF}">
-                <a14:hiddenLine xmlns:a14="http://schemas.microsoft.com/office/drawing/2010/main" xmlns="" w="9525">
+                <a14:hiddenLine xmlns="" xmlns:a14="http://schemas.microsoft.com/office/drawing/2010/main" w="9525">
                   <a:solidFill>
                     <a:srgbClr val="000000"/>
                   </a:solidFill>
@@ -1460,7 +1474,7 @@
             </a:ln>
             <a:extLst>
               <a:ext uri="{91240B29-F687-4f45-9708-019B960494DF}">
-                <a14:hiddenLine xmlns:a14="http://schemas.microsoft.com/office/drawing/2010/main" xmlns="" w="9525">
+                <a14:hiddenLine xmlns="" xmlns:a14="http://schemas.microsoft.com/office/drawing/2010/main" w="9525">
                   <a:solidFill>
                     <a:srgbClr val="000000"/>
                   </a:solidFill>
@@ -1522,7 +1536,7 @@
             </a:ln>
             <a:extLst>
               <a:ext uri="{91240B29-F687-4f45-9708-019B960494DF}">
-                <a14:hiddenLine xmlns:a14="http://schemas.microsoft.com/office/drawing/2010/main" xmlns="" w="9525">
+                <a14:hiddenLine xmlns="" xmlns:a14="http://schemas.microsoft.com/office/drawing/2010/main" w="9525">
                   <a:solidFill>
                     <a:srgbClr val="000000"/>
                   </a:solidFill>
@@ -1612,7 +1626,7 @@
             </a:ln>
             <a:extLst>
               <a:ext uri="{91240B29-F687-4f45-9708-019B960494DF}">
-                <a14:hiddenLine xmlns:a14="http://schemas.microsoft.com/office/drawing/2010/main" xmlns="" w="9525">
+                <a14:hiddenLine xmlns="" xmlns:a14="http://schemas.microsoft.com/office/drawing/2010/main" w="9525">
                   <a:solidFill>
                     <a:srgbClr val="000000"/>
                   </a:solidFill>
@@ -1702,7 +1716,7 @@
             </a:ln>
             <a:extLst>
               <a:ext uri="{91240B29-F687-4f45-9708-019B960494DF}">
-                <a14:hiddenLine xmlns:a14="http://schemas.microsoft.com/office/drawing/2010/main" xmlns="" w="9525">
+                <a14:hiddenLine xmlns="" xmlns:a14="http://schemas.microsoft.com/office/drawing/2010/main" w="9525">
                   <a:solidFill>
                     <a:srgbClr val="000000"/>
                   </a:solidFill>
@@ -1758,7 +1772,7 @@
             </a:ln>
             <a:extLst>
               <a:ext uri="{91240B29-F687-4f45-9708-019B960494DF}">
-                <a14:hiddenLine xmlns:a14="http://schemas.microsoft.com/office/drawing/2010/main" xmlns="" w="9525">
+                <a14:hiddenLine xmlns="" xmlns:a14="http://schemas.microsoft.com/office/drawing/2010/main" w="9525">
                   <a:solidFill>
                     <a:srgbClr val="000000"/>
                   </a:solidFill>
@@ -1848,7 +1862,7 @@
             </a:ln>
             <a:extLst>
               <a:ext uri="{91240B29-F687-4f45-9708-019B960494DF}">
-                <a14:hiddenLine xmlns:a14="http://schemas.microsoft.com/office/drawing/2010/main" xmlns="" w="9525">
+                <a14:hiddenLine xmlns="" xmlns:a14="http://schemas.microsoft.com/office/drawing/2010/main" w="9525">
                   <a:solidFill>
                     <a:srgbClr val="000000"/>
                   </a:solidFill>
@@ -1904,7 +1918,7 @@
             </a:ln>
             <a:extLst>
               <a:ext uri="{91240B29-F687-4f45-9708-019B960494DF}">
-                <a14:hiddenLine xmlns:a14="http://schemas.microsoft.com/office/drawing/2010/main" xmlns="" w="9525">
+                <a14:hiddenLine xmlns="" xmlns:a14="http://schemas.microsoft.com/office/drawing/2010/main" w="9525">
                   <a:solidFill>
                     <a:srgbClr val="000000"/>
                   </a:solidFill>
@@ -1994,7 +2008,7 @@
             </a:ln>
             <a:extLst>
               <a:ext uri="{91240B29-F687-4f45-9708-019B960494DF}">
-                <a14:hiddenLine xmlns:a14="http://schemas.microsoft.com/office/drawing/2010/main" xmlns="" w="9525">
+                <a14:hiddenLine xmlns="" xmlns:a14="http://schemas.microsoft.com/office/drawing/2010/main" w="9525">
                   <a:solidFill>
                     <a:srgbClr val="000000"/>
                   </a:solidFill>
@@ -2062,7 +2076,7 @@
             </a:ln>
             <a:extLst>
               <a:ext uri="{91240B29-F687-4f45-9708-019B960494DF}">
-                <a14:hiddenLine xmlns:a14="http://schemas.microsoft.com/office/drawing/2010/main" xmlns="" w="9525">
+                <a14:hiddenLine xmlns="" xmlns:a14="http://schemas.microsoft.com/office/drawing/2010/main" w="9525">
                   <a:solidFill>
                     <a:srgbClr val="000000"/>
                   </a:solidFill>
@@ -2152,7 +2166,7 @@
             </a:ln>
             <a:extLst>
               <a:ext uri="{91240B29-F687-4f45-9708-019B960494DF}">
-                <a14:hiddenLine xmlns:a14="http://schemas.microsoft.com/office/drawing/2010/main" xmlns="" w="9525">
+                <a14:hiddenLine xmlns="" xmlns:a14="http://schemas.microsoft.com/office/drawing/2010/main" w="9525">
                   <a:solidFill>
                     <a:srgbClr val="000000"/>
                   </a:solidFill>
@@ -2220,7 +2234,7 @@
             </a:ln>
             <a:extLst>
               <a:ext uri="{91240B29-F687-4f45-9708-019B960494DF}">
-                <a14:hiddenLine xmlns:a14="http://schemas.microsoft.com/office/drawing/2010/main" xmlns="" w="9525">
+                <a14:hiddenLine xmlns="" xmlns:a14="http://schemas.microsoft.com/office/drawing/2010/main" w="9525">
                   <a:solidFill>
                     <a:srgbClr val="000000"/>
                   </a:solidFill>
@@ -2310,7 +2324,7 @@
             </a:ln>
             <a:extLst>
               <a:ext uri="{91240B29-F687-4f45-9708-019B960494DF}">
-                <a14:hiddenLine xmlns:a14="http://schemas.microsoft.com/office/drawing/2010/main" xmlns="" w="9525">
+                <a14:hiddenLine xmlns="" xmlns:a14="http://schemas.microsoft.com/office/drawing/2010/main" w="9525">
                   <a:solidFill>
                     <a:srgbClr val="000000"/>
                   </a:solidFill>
@@ -2344,7 +2358,7 @@
             </a:ln>
             <a:extLst>
               <a:ext uri="{91240B29-F687-4f45-9708-019B960494DF}">
-                <a14:hiddenLine xmlns:a14="http://schemas.microsoft.com/office/drawing/2010/main" xmlns="" w="9525">
+                <a14:hiddenLine xmlns="" xmlns:a14="http://schemas.microsoft.com/office/drawing/2010/main" w="9525">
                   <a:solidFill>
                     <a:srgbClr val="000000"/>
                   </a:solidFill>
@@ -2434,7 +2448,7 @@
             </a:ln>
             <a:extLst>
               <a:ext uri="{91240B29-F687-4f45-9708-019B960494DF}">
-                <a14:hiddenLine xmlns:a14="http://schemas.microsoft.com/office/drawing/2010/main" xmlns="" w="9525">
+                <a14:hiddenLine xmlns="" xmlns:a14="http://schemas.microsoft.com/office/drawing/2010/main" w="9525">
                   <a:solidFill>
                     <a:srgbClr val="000000"/>
                   </a:solidFill>
@@ -2496,7 +2510,7 @@
             </a:ln>
             <a:extLst>
               <a:ext uri="{91240B29-F687-4f45-9708-019B960494DF}">
-                <a14:hiddenLine xmlns:a14="http://schemas.microsoft.com/office/drawing/2010/main" xmlns="" w="9525">
+                <a14:hiddenLine xmlns="" xmlns:a14="http://schemas.microsoft.com/office/drawing/2010/main" w="9525">
                   <a:solidFill>
                     <a:srgbClr val="000000"/>
                   </a:solidFill>
@@ -2558,7 +2572,7 @@
             </a:ln>
             <a:extLst>
               <a:ext uri="{91240B29-F687-4f45-9708-019B960494DF}">
-                <a14:hiddenLine xmlns:a14="http://schemas.microsoft.com/office/drawing/2010/main" xmlns="" w="9525">
+                <a14:hiddenLine xmlns="" xmlns:a14="http://schemas.microsoft.com/office/drawing/2010/main" w="9525">
                   <a:solidFill>
                     <a:srgbClr val="000000"/>
                   </a:solidFill>
@@ -2648,7 +2662,7 @@
             </a:ln>
             <a:extLst>
               <a:ext uri="{91240B29-F687-4f45-9708-019B960494DF}">
-                <a14:hiddenLine xmlns:a14="http://schemas.microsoft.com/office/drawing/2010/main" xmlns="" w="9525">
+                <a14:hiddenLine xmlns="" xmlns:a14="http://schemas.microsoft.com/office/drawing/2010/main" w="9525">
                   <a:solidFill>
                     <a:srgbClr val="000000"/>
                   </a:solidFill>
@@ -2716,7 +2730,7 @@
             </a:ln>
             <a:extLst>
               <a:ext uri="{91240B29-F687-4f45-9708-019B960494DF}">
-                <a14:hiddenLine xmlns:a14="http://schemas.microsoft.com/office/drawing/2010/main" xmlns="" w="9525">
+                <a14:hiddenLine xmlns="" xmlns:a14="http://schemas.microsoft.com/office/drawing/2010/main" w="9525">
                   <a:solidFill>
                     <a:srgbClr val="000000"/>
                   </a:solidFill>
@@ -2778,7 +2792,7 @@
             </a:ln>
             <a:extLst>
               <a:ext uri="{91240B29-F687-4f45-9708-019B960494DF}">
-                <a14:hiddenLine xmlns:a14="http://schemas.microsoft.com/office/drawing/2010/main" xmlns="" w="9525">
+                <a14:hiddenLine xmlns="" xmlns:a14="http://schemas.microsoft.com/office/drawing/2010/main" w="9525">
                   <a:solidFill>
                     <a:srgbClr val="000000"/>
                   </a:solidFill>
@@ -2868,7 +2882,7 @@
             </a:ln>
             <a:extLst>
               <a:ext uri="{91240B29-F687-4f45-9708-019B960494DF}">
-                <a14:hiddenLine xmlns:a14="http://schemas.microsoft.com/office/drawing/2010/main" xmlns="" w="9525">
+                <a14:hiddenLine xmlns="" xmlns:a14="http://schemas.microsoft.com/office/drawing/2010/main" w="9525">
                   <a:solidFill>
                     <a:srgbClr val="000000"/>
                   </a:solidFill>
@@ -2930,7 +2944,7 @@
             </a:ln>
             <a:extLst>
               <a:ext uri="{91240B29-F687-4f45-9708-019B960494DF}">
-                <a14:hiddenLine xmlns:a14="http://schemas.microsoft.com/office/drawing/2010/main" xmlns="" w="9525">
+                <a14:hiddenLine xmlns="" xmlns:a14="http://schemas.microsoft.com/office/drawing/2010/main" w="9525">
                   <a:solidFill>
                     <a:srgbClr val="000000"/>
                   </a:solidFill>
@@ -3020,7 +3034,7 @@
             </a:ln>
             <a:extLst>
               <a:ext uri="{91240B29-F687-4f45-9708-019B960494DF}">
-                <a14:hiddenLine xmlns:a14="http://schemas.microsoft.com/office/drawing/2010/main" xmlns="" w="9525">
+                <a14:hiddenLine xmlns="" xmlns:a14="http://schemas.microsoft.com/office/drawing/2010/main" w="9525">
                   <a:solidFill>
                     <a:srgbClr val="000000"/>
                   </a:solidFill>
@@ -3082,7 +3096,7 @@
             </a:ln>
             <a:extLst>
               <a:ext uri="{91240B29-F687-4f45-9708-019B960494DF}">
-                <a14:hiddenLine xmlns:a14="http://schemas.microsoft.com/office/drawing/2010/main" xmlns="" w="9525">
+                <a14:hiddenLine xmlns="" xmlns:a14="http://schemas.microsoft.com/office/drawing/2010/main" w="9525">
                   <a:solidFill>
                     <a:srgbClr val="000000"/>
                   </a:solidFill>
@@ -3172,7 +3186,7 @@
             </a:ln>
             <a:extLst>
               <a:ext uri="{91240B29-F687-4f45-9708-019B960494DF}">
-                <a14:hiddenLine xmlns:a14="http://schemas.microsoft.com/office/drawing/2010/main" xmlns="" w="9525">
+                <a14:hiddenLine xmlns="" xmlns:a14="http://schemas.microsoft.com/office/drawing/2010/main" w="9525">
                   <a:solidFill>
                     <a:srgbClr val="000000"/>
                   </a:solidFill>
@@ -3206,7 +3220,7 @@
             </a:ln>
             <a:extLst>
               <a:ext uri="{91240B29-F687-4f45-9708-019B960494DF}">
-                <a14:hiddenLine xmlns:a14="http://schemas.microsoft.com/office/drawing/2010/main" xmlns="" w="9525">
+                <a14:hiddenLine xmlns="" xmlns:a14="http://schemas.microsoft.com/office/drawing/2010/main" w="9525">
                   <a:solidFill>
                     <a:srgbClr val="000000"/>
                   </a:solidFill>
@@ -3271,7 +3285,7 @@
             </a:ln>
             <a:extLst>
               <a:ext uri="{91240B29-F687-4f45-9708-019B960494DF}">
-                <a14:hiddenLine xmlns:a14="http://schemas.microsoft.com/office/drawing/2010/main" xmlns="" w="9525">
+                <a14:hiddenLine xmlns="" xmlns:a14="http://schemas.microsoft.com/office/drawing/2010/main" w="9525">
                   <a:solidFill>
                     <a:srgbClr val="000000"/>
                   </a:solidFill>
@@ -3361,7 +3375,7 @@
             </a:ln>
             <a:extLst>
               <a:ext uri="{91240B29-F687-4f45-9708-019B960494DF}">
-                <a14:hiddenLine xmlns:a14="http://schemas.microsoft.com/office/drawing/2010/main" xmlns="" w="9525">
+                <a14:hiddenLine xmlns="" xmlns:a14="http://schemas.microsoft.com/office/drawing/2010/main" w="9525">
                   <a:solidFill>
                     <a:srgbClr val="000000"/>
                   </a:solidFill>
@@ -3423,7 +3437,7 @@
             </a:ln>
             <a:extLst>
               <a:ext uri="{91240B29-F687-4f45-9708-019B960494DF}">
-                <a14:hiddenLine xmlns:a14="http://schemas.microsoft.com/office/drawing/2010/main" xmlns="" w="9525">
+                <a14:hiddenLine xmlns="" xmlns:a14="http://schemas.microsoft.com/office/drawing/2010/main" w="9525">
                   <a:solidFill>
                     <a:srgbClr val="000000"/>
                   </a:solidFill>
@@ -3513,7 +3527,7 @@
             </a:ln>
             <a:extLst>
               <a:ext uri="{91240B29-F687-4f45-9708-019B960494DF}">
-                <a14:hiddenLine xmlns:a14="http://schemas.microsoft.com/office/drawing/2010/main" xmlns="" w="9525">
+                <a14:hiddenLine xmlns="" xmlns:a14="http://schemas.microsoft.com/office/drawing/2010/main" w="9525">
                   <a:solidFill>
                     <a:srgbClr val="000000"/>
                   </a:solidFill>
@@ -3603,7 +3617,7 @@
             </a:ln>
             <a:extLst>
               <a:ext uri="{91240B29-F687-4f45-9708-019B960494DF}">
-                <a14:hiddenLine xmlns:a14="http://schemas.microsoft.com/office/drawing/2010/main" xmlns="" w="9525">
+                <a14:hiddenLine xmlns="" xmlns:a14="http://schemas.microsoft.com/office/drawing/2010/main" w="9525">
                   <a:solidFill>
                     <a:srgbClr val="000000"/>
                   </a:solidFill>
@@ -3668,7 +3682,7 @@
             </a:ln>
             <a:extLst>
               <a:ext uri="{91240B29-F687-4f45-9708-019B960494DF}">
-                <a14:hiddenLine xmlns:a14="http://schemas.microsoft.com/office/drawing/2010/main" xmlns="" w="9525">
+                <a14:hiddenLine xmlns="" xmlns:a14="http://schemas.microsoft.com/office/drawing/2010/main" w="9525">
                   <a:solidFill>
                     <a:srgbClr val="000000"/>
                   </a:solidFill>
@@ -3730,7 +3744,7 @@
             </a:ln>
             <a:extLst>
               <a:ext uri="{91240B29-F687-4f45-9708-019B960494DF}">
-                <a14:hiddenLine xmlns:a14="http://schemas.microsoft.com/office/drawing/2010/main" xmlns="" w="9525">
+                <a14:hiddenLine xmlns="" xmlns:a14="http://schemas.microsoft.com/office/drawing/2010/main" w="9525">
                   <a:solidFill>
                     <a:srgbClr val="000000"/>
                   </a:solidFill>
@@ -3820,7 +3834,7 @@
             </a:ln>
             <a:extLst>
               <a:ext uri="{91240B29-F687-4f45-9708-019B960494DF}">
-                <a14:hiddenLine xmlns:a14="http://schemas.microsoft.com/office/drawing/2010/main" xmlns="" w="9525">
+                <a14:hiddenLine xmlns="" xmlns:a14="http://schemas.microsoft.com/office/drawing/2010/main" w="9525">
                   <a:solidFill>
                     <a:srgbClr val="000000"/>
                   </a:solidFill>
@@ -3910,7 +3924,7 @@
             </a:ln>
             <a:extLst>
               <a:ext uri="{91240B29-F687-4f45-9708-019B960494DF}">
-                <a14:hiddenLine xmlns:a14="http://schemas.microsoft.com/office/drawing/2010/main" xmlns="" w="9525">
+                <a14:hiddenLine xmlns="" xmlns:a14="http://schemas.microsoft.com/office/drawing/2010/main" w="9525">
                   <a:solidFill>
                     <a:srgbClr val="000000"/>
                   </a:solidFill>
@@ -3972,7 +3986,7 @@
             </a:ln>
             <a:extLst>
               <a:ext uri="{91240B29-F687-4f45-9708-019B960494DF}">
-                <a14:hiddenLine xmlns:a14="http://schemas.microsoft.com/office/drawing/2010/main" xmlns="" w="9525">
+                <a14:hiddenLine xmlns="" xmlns:a14="http://schemas.microsoft.com/office/drawing/2010/main" w="9525">
                   <a:solidFill>
                     <a:srgbClr val="000000"/>
                   </a:solidFill>
@@ -4092,7 +4106,7 @@
             </a:ln>
             <a:extLst>
               <a:ext uri="{91240B29-F687-4f45-9708-019B960494DF}">
-                <a14:hiddenLine xmlns:a14="http://schemas.microsoft.com/office/drawing/2010/main" xmlns="" w="9525">
+                <a14:hiddenLine xmlns="" xmlns:a14="http://schemas.microsoft.com/office/drawing/2010/main" w="9525">
                   <a:solidFill>
                     <a:srgbClr val="000000"/>
                   </a:solidFill>
@@ -4160,7 +4174,7 @@
             </a:ln>
             <a:extLst>
               <a:ext uri="{91240B29-F687-4f45-9708-019B960494DF}">
-                <a14:hiddenLine xmlns:a14="http://schemas.microsoft.com/office/drawing/2010/main" xmlns="" w="9525">
+                <a14:hiddenLine xmlns="" xmlns:a14="http://schemas.microsoft.com/office/drawing/2010/main" w="9525">
                   <a:solidFill>
                     <a:srgbClr val="000000"/>
                   </a:solidFill>
@@ -4250,7 +4264,7 @@
             </a:ln>
             <a:extLst>
               <a:ext uri="{91240B29-F687-4f45-9708-019B960494DF}">
-                <a14:hiddenLine xmlns:a14="http://schemas.microsoft.com/office/drawing/2010/main" xmlns="" w="9525">
+                <a14:hiddenLine xmlns="" xmlns:a14="http://schemas.microsoft.com/office/drawing/2010/main" w="9525">
                   <a:solidFill>
                     <a:srgbClr val="000000"/>
                   </a:solidFill>
@@ -4390,7 +4404,7 @@
           <a:p>
             <a:fld id="{48A87A34-81AB-432B-8DAE-1953F412C126}" type="datetimeFigureOut">
               <a:rPr lang="en-US" dirty="0"/>
-              <a:t>9/2/2017</a:t>
+              <a:t>9/8/2017</a:t>
             </a:fld>
             <a:endParaRPr lang="en-US" dirty="0"/>
           </a:p>
@@ -4652,7 +4666,7 @@
           <a:p>
             <a:fld id="{48A87A34-81AB-432B-8DAE-1953F412C126}" type="datetimeFigureOut">
               <a:rPr lang="en-US" dirty="0"/>
-              <a:t>9/2/2017</a:t>
+              <a:t>9/8/2017</a:t>
             </a:fld>
             <a:endParaRPr lang="en-US" dirty="0"/>
           </a:p>
@@ -4843,7 +4857,7 @@
           <a:p>
             <a:fld id="{48A87A34-81AB-432B-8DAE-1953F412C126}" type="datetimeFigureOut">
               <a:rPr lang="en-US" dirty="0"/>
-              <a:t>9/2/2017</a:t>
+              <a:t>9/8/2017</a:t>
             </a:fld>
             <a:endParaRPr lang="en-US" dirty="0"/>
           </a:p>
@@ -5101,7 +5115,7 @@
           <a:p>
             <a:fld id="{48A87A34-81AB-432B-8DAE-1953F412C126}" type="datetimeFigureOut">
               <a:rPr lang="en-US" dirty="0"/>
-              <a:t>9/2/2017</a:t>
+              <a:t>9/8/2017</a:t>
             </a:fld>
             <a:endParaRPr lang="en-US" dirty="0"/>
           </a:p>
@@ -5530,7 +5544,7 @@
           <a:p>
             <a:fld id="{48A87A34-81AB-432B-8DAE-1953F412C126}" type="datetimeFigureOut">
               <a:rPr lang="en-US" dirty="0"/>
-              <a:t>9/2/2017</a:t>
+              <a:t>9/8/2017</a:t>
             </a:fld>
             <a:endParaRPr lang="en-US" dirty="0"/>
           </a:p>
@@ -6071,7 +6085,7 @@
           <a:p>
             <a:fld id="{48A87A34-81AB-432B-8DAE-1953F412C126}" type="datetimeFigureOut">
               <a:rPr lang="en-US" dirty="0"/>
-              <a:t>9/2/2017</a:t>
+              <a:t>9/8/2017</a:t>
             </a:fld>
             <a:endParaRPr lang="en-US" dirty="0"/>
           </a:p>
@@ -6786,7 +6800,7 @@
           <a:p>
             <a:fld id="{48A87A34-81AB-432B-8DAE-1953F412C126}" type="datetimeFigureOut">
               <a:rPr lang="en-US" dirty="0"/>
-              <a:t>9/2/2017</a:t>
+              <a:t>9/8/2017</a:t>
             </a:fld>
             <a:endParaRPr lang="en-US" dirty="0"/>
           </a:p>
@@ -6951,7 +6965,7 @@
           <a:p>
             <a:fld id="{48A87A34-81AB-432B-8DAE-1953F412C126}" type="datetimeFigureOut">
               <a:rPr lang="en-US" dirty="0"/>
-              <a:t>9/2/2017</a:t>
+              <a:t>9/8/2017</a:t>
             </a:fld>
             <a:endParaRPr lang="en-US" dirty="0"/>
           </a:p>
@@ -7126,7 +7140,7 @@
           <a:p>
             <a:fld id="{48A87A34-81AB-432B-8DAE-1953F412C126}" type="datetimeFigureOut">
               <a:rPr lang="en-US" dirty="0"/>
-              <a:t>9/2/2017</a:t>
+              <a:t>9/8/2017</a:t>
             </a:fld>
             <a:endParaRPr lang="en-US" dirty="0"/>
           </a:p>
@@ -7291,7 +7305,7 @@
           <a:p>
             <a:fld id="{48A87A34-81AB-432B-8DAE-1953F412C126}" type="datetimeFigureOut">
               <a:rPr lang="en-US" dirty="0"/>
-              <a:t>9/2/2017</a:t>
+              <a:t>9/8/2017</a:t>
             </a:fld>
             <a:endParaRPr lang="en-US" dirty="0"/>
           </a:p>
@@ -7536,7 +7550,7 @@
           <a:p>
             <a:fld id="{48A87A34-81AB-432B-8DAE-1953F412C126}" type="datetimeFigureOut">
               <a:rPr lang="en-US" dirty="0"/>
-              <a:t>9/2/2017</a:t>
+              <a:t>9/8/2017</a:t>
             </a:fld>
             <a:endParaRPr lang="en-US" dirty="0"/>
           </a:p>
@@ -7763,7 +7777,7 @@
           <a:p>
             <a:fld id="{48A87A34-81AB-432B-8DAE-1953F412C126}" type="datetimeFigureOut">
               <a:rPr lang="en-US" dirty="0"/>
-              <a:t>9/2/2017</a:t>
+              <a:t>9/8/2017</a:t>
             </a:fld>
             <a:endParaRPr lang="en-US" dirty="0"/>
           </a:p>
@@ -8139,7 +8153,7 @@
           <a:p>
             <a:fld id="{48A87A34-81AB-432B-8DAE-1953F412C126}" type="datetimeFigureOut">
               <a:rPr lang="en-US" dirty="0"/>
-              <a:t>9/2/2017</a:t>
+              <a:t>9/8/2017</a:t>
             </a:fld>
             <a:endParaRPr lang="en-US" dirty="0"/>
           </a:p>
@@ -8252,7 +8266,7 @@
           <a:p>
             <a:fld id="{48A87A34-81AB-432B-8DAE-1953F412C126}" type="datetimeFigureOut">
               <a:rPr lang="en-US" dirty="0"/>
-              <a:t>9/2/2017</a:t>
+              <a:t>9/8/2017</a:t>
             </a:fld>
             <a:endParaRPr lang="en-US" dirty="0"/>
           </a:p>
@@ -8342,7 +8356,7 @@
           <a:p>
             <a:fld id="{48A87A34-81AB-432B-8DAE-1953F412C126}" type="datetimeFigureOut">
               <a:rPr lang="en-US" dirty="0"/>
-              <a:t>9/2/2017</a:t>
+              <a:t>9/8/2017</a:t>
             </a:fld>
             <a:endParaRPr lang="en-US" dirty="0"/>
           </a:p>
@@ -8586,7 +8600,7 @@
           <a:p>
             <a:fld id="{48A87A34-81AB-432B-8DAE-1953F412C126}" type="datetimeFigureOut">
               <a:rPr lang="en-US" dirty="0"/>
-              <a:t>9/2/2017</a:t>
+              <a:t>9/8/2017</a:t>
             </a:fld>
             <a:endParaRPr lang="en-US" dirty="0"/>
           </a:p>
@@ -8861,7 +8875,7 @@
           <a:p>
             <a:fld id="{48A87A34-81AB-432B-8DAE-1953F412C126}" type="datetimeFigureOut">
               <a:rPr lang="en-US" dirty="0"/>
-              <a:t>9/2/2017</a:t>
+              <a:t>9/8/2017</a:t>
             </a:fld>
             <a:endParaRPr lang="en-US" dirty="0"/>
           </a:p>
@@ -8979,7 +8993,7 @@
           <a:noFill/>
           <a:extLst>
             <a:ext uri="{909E8E84-426E-40dd-AFC4-6F175D3DCCD1}">
-              <a14:hiddenFill xmlns:a14="http://schemas.microsoft.com/office/drawing/2010/main" xmlns="">
+              <a14:hiddenFill xmlns="" xmlns:a14="http://schemas.microsoft.com/office/drawing/2010/main">
                 <a:solidFill>
                   <a:srgbClr val="FFFFFF"/>
                 </a:solidFill>
@@ -9053,7 +9067,7 @@
               </a:ln>
               <a:extLst>
                 <a:ext uri="{91240B29-F687-4f45-9708-019B960494DF}">
-                  <a14:hiddenLine xmlns:a14="http://schemas.microsoft.com/office/drawing/2010/main" xmlns="" w="9525">
+                  <a14:hiddenLine xmlns="" xmlns:a14="http://schemas.microsoft.com/office/drawing/2010/main" w="9525">
                     <a:solidFill>
                       <a:srgbClr val="000000"/>
                     </a:solidFill>
@@ -9143,7 +9157,7 @@
               </a:ln>
               <a:extLst>
                 <a:ext uri="{91240B29-F687-4f45-9708-019B960494DF}">
-                  <a14:hiddenLine xmlns:a14="http://schemas.microsoft.com/office/drawing/2010/main" xmlns="" w="9525">
+                  <a14:hiddenLine xmlns="" xmlns:a14="http://schemas.microsoft.com/office/drawing/2010/main" w="9525">
                     <a:solidFill>
                       <a:srgbClr val="000000"/>
                     </a:solidFill>
@@ -9233,7 +9247,7 @@
               </a:ln>
               <a:extLst>
                 <a:ext uri="{91240B29-F687-4f45-9708-019B960494DF}">
-                  <a14:hiddenLine xmlns:a14="http://schemas.microsoft.com/office/drawing/2010/main" xmlns="" w="9525">
+                  <a14:hiddenLine xmlns="" xmlns:a14="http://schemas.microsoft.com/office/drawing/2010/main" w="9525">
                     <a:solidFill>
                       <a:srgbClr val="000000"/>
                     </a:solidFill>
@@ -9295,7 +9309,7 @@
               </a:ln>
               <a:extLst>
                 <a:ext uri="{91240B29-F687-4f45-9708-019B960494DF}">
-                  <a14:hiddenLine xmlns:a14="http://schemas.microsoft.com/office/drawing/2010/main" xmlns="" w="9525">
+                  <a14:hiddenLine xmlns="" xmlns:a14="http://schemas.microsoft.com/office/drawing/2010/main" w="9525">
                     <a:solidFill>
                       <a:srgbClr val="000000"/>
                     </a:solidFill>
@@ -9385,7 +9399,7 @@
               </a:ln>
               <a:extLst>
                 <a:ext uri="{91240B29-F687-4f45-9708-019B960494DF}">
-                  <a14:hiddenLine xmlns:a14="http://schemas.microsoft.com/office/drawing/2010/main" xmlns="" w="9525">
+                  <a14:hiddenLine xmlns="" xmlns:a14="http://schemas.microsoft.com/office/drawing/2010/main" w="9525">
                     <a:solidFill>
                       <a:srgbClr val="000000"/>
                     </a:solidFill>
@@ -9447,7 +9461,7 @@
               </a:ln>
               <a:extLst>
                 <a:ext uri="{91240B29-F687-4f45-9708-019B960494DF}">
-                  <a14:hiddenLine xmlns:a14="http://schemas.microsoft.com/office/drawing/2010/main" xmlns="" w="9525">
+                  <a14:hiddenLine xmlns="" xmlns:a14="http://schemas.microsoft.com/office/drawing/2010/main" w="9525">
                     <a:solidFill>
                       <a:srgbClr val="000000"/>
                     </a:solidFill>
@@ -9509,7 +9523,7 @@
               </a:ln>
               <a:extLst>
                 <a:ext uri="{91240B29-F687-4f45-9708-019B960494DF}">
-                  <a14:hiddenLine xmlns:a14="http://schemas.microsoft.com/office/drawing/2010/main" xmlns="" w="9525">
+                  <a14:hiddenLine xmlns="" xmlns:a14="http://schemas.microsoft.com/office/drawing/2010/main" w="9525">
                     <a:solidFill>
                       <a:srgbClr val="000000"/>
                     </a:solidFill>
@@ -9599,7 +9613,7 @@
               </a:ln>
               <a:extLst>
                 <a:ext uri="{91240B29-F687-4f45-9708-019B960494DF}">
-                  <a14:hiddenLine xmlns:a14="http://schemas.microsoft.com/office/drawing/2010/main" xmlns="" w="9525">
+                  <a14:hiddenLine xmlns="" xmlns:a14="http://schemas.microsoft.com/office/drawing/2010/main" w="9525">
                     <a:solidFill>
                       <a:srgbClr val="000000"/>
                     </a:solidFill>
@@ -9689,7 +9703,7 @@
               </a:ln>
               <a:extLst>
                 <a:ext uri="{91240B29-F687-4f45-9708-019B960494DF}">
-                  <a14:hiddenLine xmlns:a14="http://schemas.microsoft.com/office/drawing/2010/main" xmlns="" w="9525">
+                  <a14:hiddenLine xmlns="" xmlns:a14="http://schemas.microsoft.com/office/drawing/2010/main" w="9525">
                     <a:solidFill>
                       <a:srgbClr val="000000"/>
                     </a:solidFill>
@@ -9751,7 +9765,7 @@
               </a:ln>
               <a:extLst>
                 <a:ext uri="{91240B29-F687-4f45-9708-019B960494DF}">
-                  <a14:hiddenLine xmlns:a14="http://schemas.microsoft.com/office/drawing/2010/main" xmlns="" w="9525">
+                  <a14:hiddenLine xmlns="" xmlns:a14="http://schemas.microsoft.com/office/drawing/2010/main" w="9525">
                     <a:solidFill>
                       <a:srgbClr val="000000"/>
                     </a:solidFill>
@@ -9861,7 +9875,7 @@
               </a:ln>
               <a:extLst>
                 <a:ext uri="{91240B29-F687-4f45-9708-019B960494DF}">
-                  <a14:hiddenLine xmlns:a14="http://schemas.microsoft.com/office/drawing/2010/main" xmlns="" w="9525">
+                  <a14:hiddenLine xmlns="" xmlns:a14="http://schemas.microsoft.com/office/drawing/2010/main" w="9525">
                     <a:solidFill>
                       <a:srgbClr val="000000"/>
                     </a:solidFill>
@@ -9945,7 +9959,7 @@
               </a:ln>
               <a:extLst>
                 <a:ext uri="{91240B29-F687-4f45-9708-019B960494DF}">
-                  <a14:hiddenLine xmlns:a14="http://schemas.microsoft.com/office/drawing/2010/main" xmlns="" w="9525">
+                  <a14:hiddenLine xmlns="" xmlns:a14="http://schemas.microsoft.com/office/drawing/2010/main" w="9525">
                     <a:solidFill>
                       <a:srgbClr val="000000"/>
                     </a:solidFill>
@@ -10007,7 +10021,7 @@
               </a:ln>
               <a:extLst>
                 <a:ext uri="{91240B29-F687-4f45-9708-019B960494DF}">
-                  <a14:hiddenLine xmlns:a14="http://schemas.microsoft.com/office/drawing/2010/main" xmlns="" w="9525">
+                  <a14:hiddenLine xmlns="" xmlns:a14="http://schemas.microsoft.com/office/drawing/2010/main" w="9525">
                     <a:solidFill>
                       <a:srgbClr val="000000"/>
                     </a:solidFill>
@@ -10069,7 +10083,7 @@
               </a:ln>
               <a:extLst>
                 <a:ext uri="{91240B29-F687-4f45-9708-019B960494DF}">
-                  <a14:hiddenLine xmlns:a14="http://schemas.microsoft.com/office/drawing/2010/main" xmlns="" w="9525">
+                  <a14:hiddenLine xmlns="" xmlns:a14="http://schemas.microsoft.com/office/drawing/2010/main" w="9525">
                     <a:solidFill>
                       <a:srgbClr val="000000"/>
                     </a:solidFill>
@@ -10159,7 +10173,7 @@
               </a:ln>
               <a:extLst>
                 <a:ext uri="{91240B29-F687-4f45-9708-019B960494DF}">
-                  <a14:hiddenLine xmlns:a14="http://schemas.microsoft.com/office/drawing/2010/main" xmlns="" w="9525">
+                  <a14:hiddenLine xmlns="" xmlns:a14="http://schemas.microsoft.com/office/drawing/2010/main" w="9525">
                     <a:solidFill>
                       <a:srgbClr val="000000"/>
                     </a:solidFill>
@@ -10193,7 +10207,7 @@
               </a:ln>
               <a:extLst>
                 <a:ext uri="{91240B29-F687-4f45-9708-019B960494DF}">
-                  <a14:hiddenLine xmlns:a14="http://schemas.microsoft.com/office/drawing/2010/main" xmlns="" w="9525">
+                  <a14:hiddenLine xmlns="" xmlns:a14="http://schemas.microsoft.com/office/drawing/2010/main" w="9525">
                     <a:solidFill>
                       <a:srgbClr val="000000"/>
                     </a:solidFill>
@@ -10258,7 +10272,7 @@
               </a:ln>
               <a:extLst>
                 <a:ext uri="{91240B29-F687-4f45-9708-019B960494DF}">
-                  <a14:hiddenLine xmlns:a14="http://schemas.microsoft.com/office/drawing/2010/main" xmlns="" w="9525">
+                  <a14:hiddenLine xmlns="" xmlns:a14="http://schemas.microsoft.com/office/drawing/2010/main" w="9525">
                     <a:solidFill>
                       <a:srgbClr val="000000"/>
                     </a:solidFill>
@@ -10348,7 +10362,7 @@
               </a:ln>
               <a:extLst>
                 <a:ext uri="{91240B29-F687-4f45-9708-019B960494DF}">
-                  <a14:hiddenLine xmlns:a14="http://schemas.microsoft.com/office/drawing/2010/main" xmlns="" w="9525">
+                  <a14:hiddenLine xmlns="" xmlns:a14="http://schemas.microsoft.com/office/drawing/2010/main" w="9525">
                     <a:solidFill>
                       <a:srgbClr val="000000"/>
                     </a:solidFill>
@@ -10410,7 +10424,7 @@
               </a:ln>
               <a:extLst>
                 <a:ext uri="{91240B29-F687-4f45-9708-019B960494DF}">
-                  <a14:hiddenLine xmlns:a14="http://schemas.microsoft.com/office/drawing/2010/main" xmlns="" w="9525">
+                  <a14:hiddenLine xmlns="" xmlns:a14="http://schemas.microsoft.com/office/drawing/2010/main" w="9525">
                     <a:solidFill>
                       <a:srgbClr val="000000"/>
                     </a:solidFill>
@@ -10500,7 +10514,7 @@
               </a:ln>
               <a:extLst>
                 <a:ext uri="{91240B29-F687-4f45-9708-019B960494DF}">
-                  <a14:hiddenLine xmlns:a14="http://schemas.microsoft.com/office/drawing/2010/main" xmlns="" w="9525">
+                  <a14:hiddenLine xmlns="" xmlns:a14="http://schemas.microsoft.com/office/drawing/2010/main" w="9525">
                     <a:solidFill>
                       <a:srgbClr val="000000"/>
                     </a:solidFill>
@@ -10565,7 +10579,7 @@
               </a:ln>
               <a:extLst>
                 <a:ext uri="{91240B29-F687-4f45-9708-019B960494DF}">
-                  <a14:hiddenLine xmlns:a14="http://schemas.microsoft.com/office/drawing/2010/main" xmlns="" w="9525">
+                  <a14:hiddenLine xmlns="" xmlns:a14="http://schemas.microsoft.com/office/drawing/2010/main" w="9525">
                     <a:solidFill>
                       <a:srgbClr val="000000"/>
                     </a:solidFill>
@@ -10627,7 +10641,7 @@
               </a:ln>
               <a:extLst>
                 <a:ext uri="{91240B29-F687-4f45-9708-019B960494DF}">
-                  <a14:hiddenLine xmlns:a14="http://schemas.microsoft.com/office/drawing/2010/main" xmlns="" w="9525">
+                  <a14:hiddenLine xmlns="" xmlns:a14="http://schemas.microsoft.com/office/drawing/2010/main" w="9525">
                     <a:solidFill>
                       <a:srgbClr val="000000"/>
                     </a:solidFill>
@@ -10717,7 +10731,7 @@
               </a:ln>
               <a:extLst>
                 <a:ext uri="{91240B29-F687-4f45-9708-019B960494DF}">
-                  <a14:hiddenLine xmlns:a14="http://schemas.microsoft.com/office/drawing/2010/main" xmlns="" w="9525">
+                  <a14:hiddenLine xmlns="" xmlns:a14="http://schemas.microsoft.com/office/drawing/2010/main" w="9525">
                     <a:solidFill>
                       <a:srgbClr val="000000"/>
                     </a:solidFill>
@@ -10807,7 +10821,7 @@
               </a:ln>
               <a:extLst>
                 <a:ext uri="{91240B29-F687-4f45-9708-019B960494DF}">
-                  <a14:hiddenLine xmlns:a14="http://schemas.microsoft.com/office/drawing/2010/main" xmlns="" w="9525">
+                  <a14:hiddenLine xmlns="" xmlns:a14="http://schemas.microsoft.com/office/drawing/2010/main" w="9525">
                     <a:solidFill>
                       <a:srgbClr val="000000"/>
                     </a:solidFill>
@@ -10872,7 +10886,7 @@
               </a:ln>
               <a:extLst>
                 <a:ext uri="{91240B29-F687-4f45-9708-019B960494DF}">
-                  <a14:hiddenLine xmlns:a14="http://schemas.microsoft.com/office/drawing/2010/main" xmlns="" w="9525">
+                  <a14:hiddenLine xmlns="" xmlns:a14="http://schemas.microsoft.com/office/drawing/2010/main" w="9525">
                     <a:solidFill>
                       <a:srgbClr val="000000"/>
                     </a:solidFill>
@@ -10992,7 +11006,7 @@
               </a:ln>
               <a:extLst>
                 <a:ext uri="{91240B29-F687-4f45-9708-019B960494DF}">
-                  <a14:hiddenLine xmlns:a14="http://schemas.microsoft.com/office/drawing/2010/main" xmlns="" w="9525">
+                  <a14:hiddenLine xmlns="" xmlns:a14="http://schemas.microsoft.com/office/drawing/2010/main" w="9525">
                     <a:solidFill>
                       <a:srgbClr val="000000"/>
                     </a:solidFill>
@@ -11073,7 +11087,7 @@
               </a:ln>
               <a:extLst>
                 <a:ext uri="{91240B29-F687-4f45-9708-019B960494DF}">
-                  <a14:hiddenLine xmlns:a14="http://schemas.microsoft.com/office/drawing/2010/main" xmlns="" w="9525">
+                  <a14:hiddenLine xmlns="" xmlns:a14="http://schemas.microsoft.com/office/drawing/2010/main" w="9525">
                     <a:solidFill>
                       <a:srgbClr val="000000"/>
                     </a:solidFill>
@@ -11188,7 +11202,7 @@
               </a:ln>
               <a:extLst>
                 <a:ext uri="{91240B29-F687-4f45-9708-019B960494DF}">
-                  <a14:hiddenLine xmlns:a14="http://schemas.microsoft.com/office/drawing/2010/main" xmlns="" w="9525">
+                  <a14:hiddenLine xmlns="" xmlns:a14="http://schemas.microsoft.com/office/drawing/2010/main" w="9525">
                     <a:solidFill>
                       <a:srgbClr val="000000"/>
                     </a:solidFill>
@@ -11278,7 +11292,7 @@
               </a:ln>
               <a:extLst>
                 <a:ext uri="{91240B29-F687-4f45-9708-019B960494DF}">
-                  <a14:hiddenLine xmlns:a14="http://schemas.microsoft.com/office/drawing/2010/main" xmlns="" w="9525">
+                  <a14:hiddenLine xmlns="" xmlns:a14="http://schemas.microsoft.com/office/drawing/2010/main" w="9525">
                     <a:solidFill>
                       <a:srgbClr val="000000"/>
                     </a:solidFill>
@@ -11343,7 +11357,7 @@
               </a:ln>
               <a:extLst>
                 <a:ext uri="{91240B29-F687-4f45-9708-019B960494DF}">
-                  <a14:hiddenLine xmlns:a14="http://schemas.microsoft.com/office/drawing/2010/main" xmlns="" w="9525">
+                  <a14:hiddenLine xmlns="" xmlns:a14="http://schemas.microsoft.com/office/drawing/2010/main" w="9525">
                     <a:solidFill>
                       <a:srgbClr val="000000"/>
                     </a:solidFill>
@@ -11433,7 +11447,7 @@
               </a:ln>
               <a:extLst>
                 <a:ext uri="{91240B29-F687-4f45-9708-019B960494DF}">
-                  <a14:hiddenLine xmlns:a14="http://schemas.microsoft.com/office/drawing/2010/main" xmlns="" w="9525">
+                  <a14:hiddenLine xmlns="" xmlns:a14="http://schemas.microsoft.com/office/drawing/2010/main" w="9525">
                     <a:solidFill>
                       <a:srgbClr val="000000"/>
                     </a:solidFill>
@@ -11501,7 +11515,7 @@
               </a:ln>
               <a:extLst>
                 <a:ext uri="{91240B29-F687-4f45-9708-019B960494DF}">
-                  <a14:hiddenLine xmlns:a14="http://schemas.microsoft.com/office/drawing/2010/main" xmlns="" w="9525">
+                  <a14:hiddenLine xmlns="" xmlns:a14="http://schemas.microsoft.com/office/drawing/2010/main" w="9525">
                     <a:solidFill>
                       <a:srgbClr val="000000"/>
                     </a:solidFill>
@@ -11591,7 +11605,7 @@
               </a:ln>
               <a:extLst>
                 <a:ext uri="{91240B29-F687-4f45-9708-019B960494DF}">
-                  <a14:hiddenLine xmlns:a14="http://schemas.microsoft.com/office/drawing/2010/main" xmlns="" w="9525">
+                  <a14:hiddenLine xmlns="" xmlns:a14="http://schemas.microsoft.com/office/drawing/2010/main" w="9525">
                     <a:solidFill>
                       <a:srgbClr val="000000"/>
                     </a:solidFill>
@@ -11659,7 +11673,7 @@
               </a:ln>
               <a:extLst>
                 <a:ext uri="{91240B29-F687-4f45-9708-019B960494DF}">
-                  <a14:hiddenLine xmlns:a14="http://schemas.microsoft.com/office/drawing/2010/main" xmlns="" w="9525">
+                  <a14:hiddenLine xmlns="" xmlns:a14="http://schemas.microsoft.com/office/drawing/2010/main" w="9525">
                     <a:solidFill>
                       <a:srgbClr val="000000"/>
                     </a:solidFill>
@@ -11749,7 +11763,7 @@
               </a:ln>
               <a:extLst>
                 <a:ext uri="{91240B29-F687-4f45-9708-019B960494DF}">
-                  <a14:hiddenLine xmlns:a14="http://schemas.microsoft.com/office/drawing/2010/main" xmlns="" w="9525">
+                  <a14:hiddenLine xmlns="" xmlns:a14="http://schemas.microsoft.com/office/drawing/2010/main" w="9525">
                     <a:solidFill>
                       <a:srgbClr val="000000"/>
                     </a:solidFill>
@@ -11783,7 +11797,7 @@
               </a:ln>
               <a:extLst>
                 <a:ext uri="{91240B29-F687-4f45-9708-019B960494DF}">
-                  <a14:hiddenLine xmlns:a14="http://schemas.microsoft.com/office/drawing/2010/main" xmlns="" w="9525">
+                  <a14:hiddenLine xmlns="" xmlns:a14="http://schemas.microsoft.com/office/drawing/2010/main" w="9525">
                     <a:solidFill>
                       <a:srgbClr val="000000"/>
                     </a:solidFill>
@@ -11924,7 +11938,7 @@
             <a:fld id="{48A87A34-81AB-432B-8DAE-1953F412C126}" type="datetimeFigureOut">
               <a:rPr lang="en-US" dirty="0"/>
               <a:pPr/>
-              <a:t>9/2/2017</a:t>
+              <a:t>9/8/2017</a:t>
             </a:fld>
             <a:endParaRPr lang="en-US" dirty="0"/>
           </a:p>
@@ -12934,6 +12948,2936 @@
 </p:sld>
 </file>
 
+<file path=ppt/slides/slide3.xml><?xml version="1.0" encoding="utf-8"?>
+<p:sld xmlns:a="http://schemas.openxmlformats.org/drawingml/2006/main" xmlns:r="http://schemas.openxmlformats.org/officeDocument/2006/relationships" xmlns:p="http://schemas.openxmlformats.org/presentationml/2006/main">
+  <p:cSld>
+    <p:spTree>
+      <p:nvGrpSpPr>
+        <p:cNvPr id="1" name=""/>
+        <p:cNvGrpSpPr/>
+        <p:nvPr/>
+      </p:nvGrpSpPr>
+      <p:grpSpPr>
+        <a:xfrm>
+          <a:off x="0" y="0"/>
+          <a:ext cx="0" cy="0"/>
+          <a:chOff x="0" y="0"/>
+          <a:chExt cx="0" cy="0"/>
+        </a:xfrm>
+      </p:grpSpPr>
+      <p:sp>
+        <p:nvSpPr>
+          <p:cNvPr id="2" name="Title 1">
+            <a:extLst>
+              <a:ext uri="{FF2B5EF4-FFF2-40B4-BE49-F238E27FC236}">
+                <a16:creationId xmlns:a16="http://schemas.microsoft.com/office/drawing/2014/main" id="{54068FE7-0ACF-4C00-B467-5AB46E211A0E}"/>
+              </a:ext>
+            </a:extLst>
+          </p:cNvPr>
+          <p:cNvSpPr>
+            <a:spLocks noGrp="1"/>
+          </p:cNvSpPr>
+          <p:nvPr>
+            <p:ph type="title"/>
+          </p:nvPr>
+        </p:nvSpPr>
+        <p:spPr/>
+        <p:txBody>
+          <a:bodyPr/>
+          <a:lstStyle/>
+          <a:p>
+            <a:r>
+              <a:rPr lang="en-US" dirty="0"/>
+              <a:t>Quantifiers</a:t>
+            </a:r>
+          </a:p>
+        </p:txBody>
+      </p:sp>
+      <p:sp>
+        <p:nvSpPr>
+          <p:cNvPr id="3" name="Content Placeholder 2">
+            <a:extLst>
+              <a:ext uri="{FF2B5EF4-FFF2-40B4-BE49-F238E27FC236}">
+                <a16:creationId xmlns:a16="http://schemas.microsoft.com/office/drawing/2014/main" id="{9A926697-6382-43DC-B53B-DEB73F024A4D}"/>
+              </a:ext>
+            </a:extLst>
+          </p:cNvPr>
+          <p:cNvSpPr>
+            <a:spLocks noGrp="1"/>
+          </p:cNvSpPr>
+          <p:nvPr>
+            <p:ph idx="1"/>
+          </p:nvPr>
+        </p:nvSpPr>
+        <p:spPr/>
+        <p:txBody>
+          <a:bodyPr/>
+          <a:lstStyle/>
+          <a:p>
+            <a:pPr marL="0" indent="0">
+              <a:buNone/>
+            </a:pPr>
+            <a:r>
+              <a:rPr lang="en-US" dirty="0"/>
+              <a:t>∀ - Universal Quantifier</a:t>
+            </a:r>
+          </a:p>
+          <a:p>
+            <a:pPr marL="0" indent="0">
+              <a:buNone/>
+            </a:pPr>
+            <a:r>
+              <a:rPr lang="en-US" dirty="0"/>
+              <a:t>∀</a:t>
+            </a:r>
+            <a:r>
+              <a:rPr lang="en-US" dirty="0" err="1"/>
+              <a:t>xP</a:t>
+            </a:r>
+            <a:r>
+              <a:rPr lang="en-US" dirty="0"/>
+              <a:t>(x) -&gt; “For all x, P(x) is true”</a:t>
+            </a:r>
+          </a:p>
+          <a:p>
+            <a:pPr marL="0" indent="0">
+              <a:buNone/>
+            </a:pPr>
+            <a:r>
+              <a:rPr lang="en-US" dirty="0"/>
+              <a:t>∀</a:t>
+            </a:r>
+            <a:r>
+              <a:rPr lang="en-US" dirty="0" err="1"/>
+              <a:t>xP</a:t>
+            </a:r>
+            <a:r>
+              <a:rPr lang="en-US" dirty="0"/>
+              <a:t>(x) = </a:t>
+            </a:r>
+            <a:r>
+              <a:rPr lang="en-US" dirty="0" err="1"/>
+              <a:t>x+x</a:t>
+            </a:r>
+            <a:r>
+              <a:rPr lang="en-US" dirty="0"/>
+              <a:t> is even</a:t>
+            </a:r>
+          </a:p>
+          <a:p>
+            <a:pPr marL="0" indent="0">
+              <a:buNone/>
+            </a:pPr>
+            <a:r>
+              <a:rPr lang="en-US" dirty="0"/>
+              <a:t>∀</a:t>
+            </a:r>
+            <a:r>
+              <a:rPr lang="en-US" dirty="0" err="1"/>
+              <a:t>x∀yP</a:t>
+            </a:r>
+            <a:r>
+              <a:rPr lang="en-US" dirty="0"/>
+              <a:t>(</a:t>
+            </a:r>
+            <a:r>
+              <a:rPr lang="en-US" dirty="0" err="1"/>
+              <a:t>x,y</a:t>
+            </a:r>
+            <a:r>
+              <a:rPr lang="en-US" dirty="0"/>
+              <a:t>) = x is greater than y</a:t>
+            </a:r>
+          </a:p>
+          <a:p>
+            <a:pPr marL="0" indent="0">
+              <a:buNone/>
+            </a:pPr>
+            <a:endParaRPr lang="en-US" dirty="0"/>
+          </a:p>
+        </p:txBody>
+      </p:sp>
+    </p:spTree>
+    <p:extLst>
+      <p:ext uri="{BB962C8B-B14F-4D97-AF65-F5344CB8AC3E}">
+        <p14:creationId xmlns:p14="http://schemas.microsoft.com/office/powerpoint/2010/main" val="2920650817"/>
+      </p:ext>
+    </p:extLst>
+  </p:cSld>
+  <p:clrMapOvr>
+    <a:masterClrMapping/>
+  </p:clrMapOvr>
+  <p:timing>
+    <p:tnLst>
+      <p:par>
+        <p:cTn id="1" dur="indefinite" restart="never" nodeType="tmRoot">
+          <p:childTnLst>
+            <p:seq concurrent="1" nextAc="seek">
+              <p:cTn id="2" dur="indefinite" nodeType="mainSeq">
+                <p:childTnLst>
+                  <p:par>
+                    <p:cTn id="3" fill="hold">
+                      <p:stCondLst>
+                        <p:cond delay="indefinite"/>
+                      </p:stCondLst>
+                      <p:childTnLst>
+                        <p:par>
+                          <p:cTn id="4" fill="hold">
+                            <p:stCondLst>
+                              <p:cond delay="0"/>
+                            </p:stCondLst>
+                            <p:childTnLst>
+                              <p:par>
+                                <p:cTn id="5" presetID="10" presetClass="entr" presetSubtype="0" fill="hold" grpId="0" nodeType="clickEffect">
+                                  <p:stCondLst>
+                                    <p:cond delay="0"/>
+                                  </p:stCondLst>
+                                  <p:childTnLst>
+                                    <p:set>
+                                      <p:cBhvr>
+                                        <p:cTn id="6" dur="1" fill="hold">
+                                          <p:stCondLst>
+                                            <p:cond delay="0"/>
+                                          </p:stCondLst>
+                                        </p:cTn>
+                                        <p:tgtEl>
+                                          <p:spTgt spid="3">
+                                            <p:txEl>
+                                              <p:pRg st="0" end="0"/>
+                                            </p:txEl>
+                                          </p:spTgt>
+                                        </p:tgtEl>
+                                        <p:attrNameLst>
+                                          <p:attrName>style.visibility</p:attrName>
+                                        </p:attrNameLst>
+                                      </p:cBhvr>
+                                      <p:to>
+                                        <p:strVal val="visible"/>
+                                      </p:to>
+                                    </p:set>
+                                    <p:animEffect transition="in" filter="fade">
+                                      <p:cBhvr>
+                                        <p:cTn id="7" dur="500"/>
+                                        <p:tgtEl>
+                                          <p:spTgt spid="3">
+                                            <p:txEl>
+                                              <p:pRg st="0" end="0"/>
+                                            </p:txEl>
+                                          </p:spTgt>
+                                        </p:tgtEl>
+                                      </p:cBhvr>
+                                    </p:animEffect>
+                                  </p:childTnLst>
+                                </p:cTn>
+                              </p:par>
+                            </p:childTnLst>
+                          </p:cTn>
+                        </p:par>
+                      </p:childTnLst>
+                    </p:cTn>
+                  </p:par>
+                  <p:par>
+                    <p:cTn id="8" fill="hold">
+                      <p:stCondLst>
+                        <p:cond delay="indefinite"/>
+                      </p:stCondLst>
+                      <p:childTnLst>
+                        <p:par>
+                          <p:cTn id="9" fill="hold">
+                            <p:stCondLst>
+                              <p:cond delay="0"/>
+                            </p:stCondLst>
+                            <p:childTnLst>
+                              <p:par>
+                                <p:cTn id="10" presetID="10" presetClass="entr" presetSubtype="0" fill="hold" grpId="0" nodeType="clickEffect">
+                                  <p:stCondLst>
+                                    <p:cond delay="0"/>
+                                  </p:stCondLst>
+                                  <p:childTnLst>
+                                    <p:set>
+                                      <p:cBhvr>
+                                        <p:cTn id="11" dur="1" fill="hold">
+                                          <p:stCondLst>
+                                            <p:cond delay="0"/>
+                                          </p:stCondLst>
+                                        </p:cTn>
+                                        <p:tgtEl>
+                                          <p:spTgt spid="3">
+                                            <p:txEl>
+                                              <p:pRg st="1" end="1"/>
+                                            </p:txEl>
+                                          </p:spTgt>
+                                        </p:tgtEl>
+                                        <p:attrNameLst>
+                                          <p:attrName>style.visibility</p:attrName>
+                                        </p:attrNameLst>
+                                      </p:cBhvr>
+                                      <p:to>
+                                        <p:strVal val="visible"/>
+                                      </p:to>
+                                    </p:set>
+                                    <p:animEffect transition="in" filter="fade">
+                                      <p:cBhvr>
+                                        <p:cTn id="12" dur="500"/>
+                                        <p:tgtEl>
+                                          <p:spTgt spid="3">
+                                            <p:txEl>
+                                              <p:pRg st="1" end="1"/>
+                                            </p:txEl>
+                                          </p:spTgt>
+                                        </p:tgtEl>
+                                      </p:cBhvr>
+                                    </p:animEffect>
+                                  </p:childTnLst>
+                                </p:cTn>
+                              </p:par>
+                            </p:childTnLst>
+                          </p:cTn>
+                        </p:par>
+                      </p:childTnLst>
+                    </p:cTn>
+                  </p:par>
+                  <p:par>
+                    <p:cTn id="13" fill="hold">
+                      <p:stCondLst>
+                        <p:cond delay="indefinite"/>
+                      </p:stCondLst>
+                      <p:childTnLst>
+                        <p:par>
+                          <p:cTn id="14" fill="hold">
+                            <p:stCondLst>
+                              <p:cond delay="0"/>
+                            </p:stCondLst>
+                            <p:childTnLst>
+                              <p:par>
+                                <p:cTn id="15" presetID="10" presetClass="entr" presetSubtype="0" fill="hold" grpId="0" nodeType="clickEffect">
+                                  <p:stCondLst>
+                                    <p:cond delay="0"/>
+                                  </p:stCondLst>
+                                  <p:childTnLst>
+                                    <p:set>
+                                      <p:cBhvr>
+                                        <p:cTn id="16" dur="1" fill="hold">
+                                          <p:stCondLst>
+                                            <p:cond delay="0"/>
+                                          </p:stCondLst>
+                                        </p:cTn>
+                                        <p:tgtEl>
+                                          <p:spTgt spid="3">
+                                            <p:txEl>
+                                              <p:pRg st="2" end="2"/>
+                                            </p:txEl>
+                                          </p:spTgt>
+                                        </p:tgtEl>
+                                        <p:attrNameLst>
+                                          <p:attrName>style.visibility</p:attrName>
+                                        </p:attrNameLst>
+                                      </p:cBhvr>
+                                      <p:to>
+                                        <p:strVal val="visible"/>
+                                      </p:to>
+                                    </p:set>
+                                    <p:animEffect transition="in" filter="fade">
+                                      <p:cBhvr>
+                                        <p:cTn id="17" dur="500"/>
+                                        <p:tgtEl>
+                                          <p:spTgt spid="3">
+                                            <p:txEl>
+                                              <p:pRg st="2" end="2"/>
+                                            </p:txEl>
+                                          </p:spTgt>
+                                        </p:tgtEl>
+                                      </p:cBhvr>
+                                    </p:animEffect>
+                                  </p:childTnLst>
+                                </p:cTn>
+                              </p:par>
+                            </p:childTnLst>
+                          </p:cTn>
+                        </p:par>
+                      </p:childTnLst>
+                    </p:cTn>
+                  </p:par>
+                  <p:par>
+                    <p:cTn id="18" fill="hold">
+                      <p:stCondLst>
+                        <p:cond delay="indefinite"/>
+                      </p:stCondLst>
+                      <p:childTnLst>
+                        <p:par>
+                          <p:cTn id="19" fill="hold">
+                            <p:stCondLst>
+                              <p:cond delay="0"/>
+                            </p:stCondLst>
+                            <p:childTnLst>
+                              <p:par>
+                                <p:cTn id="20" presetID="10" presetClass="entr" presetSubtype="0" fill="hold" grpId="0" nodeType="clickEffect">
+                                  <p:stCondLst>
+                                    <p:cond delay="0"/>
+                                  </p:stCondLst>
+                                  <p:childTnLst>
+                                    <p:set>
+                                      <p:cBhvr>
+                                        <p:cTn id="21" dur="1" fill="hold">
+                                          <p:stCondLst>
+                                            <p:cond delay="0"/>
+                                          </p:stCondLst>
+                                        </p:cTn>
+                                        <p:tgtEl>
+                                          <p:spTgt spid="3">
+                                            <p:txEl>
+                                              <p:pRg st="3" end="3"/>
+                                            </p:txEl>
+                                          </p:spTgt>
+                                        </p:tgtEl>
+                                        <p:attrNameLst>
+                                          <p:attrName>style.visibility</p:attrName>
+                                        </p:attrNameLst>
+                                      </p:cBhvr>
+                                      <p:to>
+                                        <p:strVal val="visible"/>
+                                      </p:to>
+                                    </p:set>
+                                    <p:animEffect transition="in" filter="fade">
+                                      <p:cBhvr>
+                                        <p:cTn id="22" dur="500"/>
+                                        <p:tgtEl>
+                                          <p:spTgt spid="3">
+                                            <p:txEl>
+                                              <p:pRg st="3" end="3"/>
+                                            </p:txEl>
+                                          </p:spTgt>
+                                        </p:tgtEl>
+                                      </p:cBhvr>
+                                    </p:animEffect>
+                                  </p:childTnLst>
+                                </p:cTn>
+                              </p:par>
+                            </p:childTnLst>
+                          </p:cTn>
+                        </p:par>
+                      </p:childTnLst>
+                    </p:cTn>
+                  </p:par>
+                </p:childTnLst>
+              </p:cTn>
+              <p:prevCondLst>
+                <p:cond evt="onPrev" delay="0">
+                  <p:tgtEl>
+                    <p:sldTgt/>
+                  </p:tgtEl>
+                </p:cond>
+              </p:prevCondLst>
+              <p:nextCondLst>
+                <p:cond evt="onNext" delay="0">
+                  <p:tgtEl>
+                    <p:sldTgt/>
+                  </p:tgtEl>
+                </p:cond>
+              </p:nextCondLst>
+            </p:seq>
+          </p:childTnLst>
+        </p:cTn>
+      </p:par>
+    </p:tnLst>
+    <p:bldLst>
+      <p:bldP spid="3" grpId="0" build="p"/>
+    </p:bldLst>
+  </p:timing>
+</p:sld>
+</file>
+
+<file path=ppt/slides/slide4.xml><?xml version="1.0" encoding="utf-8"?>
+<p:sld xmlns:a="http://schemas.openxmlformats.org/drawingml/2006/main" xmlns:r="http://schemas.openxmlformats.org/officeDocument/2006/relationships" xmlns:p="http://schemas.openxmlformats.org/presentationml/2006/main">
+  <p:cSld>
+    <p:spTree>
+      <p:nvGrpSpPr>
+        <p:cNvPr id="1" name=""/>
+        <p:cNvGrpSpPr/>
+        <p:nvPr/>
+      </p:nvGrpSpPr>
+      <p:grpSpPr>
+        <a:xfrm>
+          <a:off x="0" y="0"/>
+          <a:ext cx="0" cy="0"/>
+          <a:chOff x="0" y="0"/>
+          <a:chExt cx="0" cy="0"/>
+        </a:xfrm>
+      </p:grpSpPr>
+      <p:sp>
+        <p:nvSpPr>
+          <p:cNvPr id="2" name="Title 1">
+            <a:extLst>
+              <a:ext uri="{FF2B5EF4-FFF2-40B4-BE49-F238E27FC236}">
+                <a16:creationId xmlns:a16="http://schemas.microsoft.com/office/drawing/2014/main" id="{54068FE7-0ACF-4C00-B467-5AB46E211A0E}"/>
+              </a:ext>
+            </a:extLst>
+          </p:cNvPr>
+          <p:cNvSpPr>
+            <a:spLocks noGrp="1"/>
+          </p:cNvSpPr>
+          <p:nvPr>
+            <p:ph type="title"/>
+          </p:nvPr>
+        </p:nvSpPr>
+        <p:spPr/>
+        <p:txBody>
+          <a:bodyPr/>
+          <a:lstStyle/>
+          <a:p>
+            <a:r>
+              <a:rPr lang="en-US" dirty="0"/>
+              <a:t>Quantifiers</a:t>
+            </a:r>
+          </a:p>
+        </p:txBody>
+      </p:sp>
+      <p:sp>
+        <p:nvSpPr>
+          <p:cNvPr id="3" name="Content Placeholder 2">
+            <a:extLst>
+              <a:ext uri="{FF2B5EF4-FFF2-40B4-BE49-F238E27FC236}">
+                <a16:creationId xmlns:a16="http://schemas.microsoft.com/office/drawing/2014/main" id="{9A926697-6382-43DC-B53B-DEB73F024A4D}"/>
+              </a:ext>
+            </a:extLst>
+          </p:cNvPr>
+          <p:cNvSpPr>
+            <a:spLocks noGrp="1"/>
+          </p:cNvSpPr>
+          <p:nvPr>
+            <p:ph idx="1"/>
+          </p:nvPr>
+        </p:nvSpPr>
+        <p:spPr/>
+        <p:txBody>
+          <a:bodyPr/>
+          <a:lstStyle/>
+          <a:p>
+            <a:pPr marL="0" indent="0">
+              <a:buNone/>
+            </a:pPr>
+            <a:r>
+              <a:rPr lang="en-US" dirty="0"/>
+              <a:t>∃ - Existential Quantifier</a:t>
+            </a:r>
+          </a:p>
+          <a:p>
+            <a:pPr marL="0" indent="0">
+              <a:buNone/>
+            </a:pPr>
+            <a:r>
+              <a:rPr lang="en-US" dirty="0"/>
+              <a:t>∃</a:t>
+            </a:r>
+            <a:r>
+              <a:rPr lang="en-US" dirty="0" err="1"/>
+              <a:t>xP</a:t>
+            </a:r>
+            <a:r>
+              <a:rPr lang="en-US" dirty="0"/>
+              <a:t>(x) -&gt; “There exists an x, such that P(x) is true”</a:t>
+            </a:r>
+          </a:p>
+          <a:p>
+            <a:pPr marL="0" indent="0">
+              <a:buNone/>
+            </a:pPr>
+            <a:r>
+              <a:rPr lang="en-US" dirty="0"/>
+              <a:t>∃</a:t>
+            </a:r>
+            <a:r>
+              <a:rPr lang="en-US" dirty="0" err="1"/>
+              <a:t>xP</a:t>
+            </a:r>
+            <a:r>
+              <a:rPr lang="en-US" dirty="0"/>
+              <a:t>(x) = </a:t>
+            </a:r>
+            <a:r>
+              <a:rPr lang="en-US" dirty="0" err="1"/>
+              <a:t>x+x</a:t>
+            </a:r>
+            <a:r>
+              <a:rPr lang="en-US" dirty="0"/>
+              <a:t> is even</a:t>
+            </a:r>
+          </a:p>
+          <a:p>
+            <a:pPr marL="0" indent="0">
+              <a:buNone/>
+            </a:pPr>
+            <a:r>
+              <a:rPr lang="en-US" dirty="0"/>
+              <a:t>∃x ∃</a:t>
+            </a:r>
+            <a:r>
+              <a:rPr lang="en-US" dirty="0" err="1"/>
+              <a:t>yP</a:t>
+            </a:r>
+            <a:r>
+              <a:rPr lang="en-US" dirty="0"/>
+              <a:t>(</a:t>
+            </a:r>
+            <a:r>
+              <a:rPr lang="en-US" dirty="0" err="1"/>
+              <a:t>x,y</a:t>
+            </a:r>
+            <a:r>
+              <a:rPr lang="en-US" dirty="0"/>
+              <a:t>) = x is greater than y</a:t>
+            </a:r>
+          </a:p>
+          <a:p>
+            <a:pPr marL="0" indent="0">
+              <a:buNone/>
+            </a:pPr>
+            <a:r>
+              <a:rPr lang="en-US" dirty="0"/>
+              <a:t>∃</a:t>
+            </a:r>
+            <a:r>
+              <a:rPr lang="en-US" dirty="0" err="1"/>
+              <a:t>x∀yP</a:t>
+            </a:r>
+            <a:r>
+              <a:rPr lang="en-US" dirty="0"/>
+              <a:t>(</a:t>
+            </a:r>
+            <a:r>
+              <a:rPr lang="en-US" dirty="0" err="1"/>
+              <a:t>x,y</a:t>
+            </a:r>
+            <a:r>
+              <a:rPr lang="en-US" dirty="0"/>
+              <a:t>) = x is greater than y</a:t>
+            </a:r>
+          </a:p>
+          <a:p>
+            <a:pPr marL="0" indent="0">
+              <a:buNone/>
+            </a:pPr>
+            <a:r>
+              <a:rPr lang="en-US" dirty="0"/>
+              <a:t>∀</a:t>
+            </a:r>
+            <a:r>
+              <a:rPr lang="en-US" dirty="0" err="1"/>
+              <a:t>x∃yP</a:t>
+            </a:r>
+            <a:r>
+              <a:rPr lang="en-US" dirty="0"/>
+              <a:t>(</a:t>
+            </a:r>
+            <a:r>
+              <a:rPr lang="en-US" dirty="0" err="1"/>
+              <a:t>x,y</a:t>
+            </a:r>
+            <a:r>
+              <a:rPr lang="en-US" dirty="0"/>
+              <a:t>) = x is greater than y</a:t>
+            </a:r>
+          </a:p>
+          <a:p>
+            <a:pPr marL="0" indent="0">
+              <a:buNone/>
+            </a:pPr>
+            <a:endParaRPr lang="en-US" dirty="0"/>
+          </a:p>
+        </p:txBody>
+      </p:sp>
+    </p:spTree>
+    <p:extLst>
+      <p:ext uri="{BB962C8B-B14F-4D97-AF65-F5344CB8AC3E}">
+        <p14:creationId xmlns:p14="http://schemas.microsoft.com/office/powerpoint/2010/main" val="752038288"/>
+      </p:ext>
+    </p:extLst>
+  </p:cSld>
+  <p:clrMapOvr>
+    <a:masterClrMapping/>
+  </p:clrMapOvr>
+  <p:timing>
+    <p:tnLst>
+      <p:par>
+        <p:cTn id="1" dur="indefinite" restart="never" nodeType="tmRoot">
+          <p:childTnLst>
+            <p:seq concurrent="1" nextAc="seek">
+              <p:cTn id="2" dur="indefinite" nodeType="mainSeq">
+                <p:childTnLst>
+                  <p:par>
+                    <p:cTn id="3" fill="hold">
+                      <p:stCondLst>
+                        <p:cond delay="indefinite"/>
+                      </p:stCondLst>
+                      <p:childTnLst>
+                        <p:par>
+                          <p:cTn id="4" fill="hold">
+                            <p:stCondLst>
+                              <p:cond delay="0"/>
+                            </p:stCondLst>
+                            <p:childTnLst>
+                              <p:par>
+                                <p:cTn id="5" presetID="10" presetClass="entr" presetSubtype="0" fill="hold" grpId="0" nodeType="clickEffect">
+                                  <p:stCondLst>
+                                    <p:cond delay="0"/>
+                                  </p:stCondLst>
+                                  <p:childTnLst>
+                                    <p:set>
+                                      <p:cBhvr>
+                                        <p:cTn id="6" dur="1" fill="hold">
+                                          <p:stCondLst>
+                                            <p:cond delay="0"/>
+                                          </p:stCondLst>
+                                        </p:cTn>
+                                        <p:tgtEl>
+                                          <p:spTgt spid="3">
+                                            <p:txEl>
+                                              <p:pRg st="0" end="0"/>
+                                            </p:txEl>
+                                          </p:spTgt>
+                                        </p:tgtEl>
+                                        <p:attrNameLst>
+                                          <p:attrName>style.visibility</p:attrName>
+                                        </p:attrNameLst>
+                                      </p:cBhvr>
+                                      <p:to>
+                                        <p:strVal val="visible"/>
+                                      </p:to>
+                                    </p:set>
+                                    <p:animEffect transition="in" filter="fade">
+                                      <p:cBhvr>
+                                        <p:cTn id="7" dur="500"/>
+                                        <p:tgtEl>
+                                          <p:spTgt spid="3">
+                                            <p:txEl>
+                                              <p:pRg st="0" end="0"/>
+                                            </p:txEl>
+                                          </p:spTgt>
+                                        </p:tgtEl>
+                                      </p:cBhvr>
+                                    </p:animEffect>
+                                  </p:childTnLst>
+                                </p:cTn>
+                              </p:par>
+                            </p:childTnLst>
+                          </p:cTn>
+                        </p:par>
+                      </p:childTnLst>
+                    </p:cTn>
+                  </p:par>
+                  <p:par>
+                    <p:cTn id="8" fill="hold">
+                      <p:stCondLst>
+                        <p:cond delay="indefinite"/>
+                      </p:stCondLst>
+                      <p:childTnLst>
+                        <p:par>
+                          <p:cTn id="9" fill="hold">
+                            <p:stCondLst>
+                              <p:cond delay="0"/>
+                            </p:stCondLst>
+                            <p:childTnLst>
+                              <p:par>
+                                <p:cTn id="10" presetID="10" presetClass="entr" presetSubtype="0" fill="hold" grpId="0" nodeType="clickEffect">
+                                  <p:stCondLst>
+                                    <p:cond delay="0"/>
+                                  </p:stCondLst>
+                                  <p:childTnLst>
+                                    <p:set>
+                                      <p:cBhvr>
+                                        <p:cTn id="11" dur="1" fill="hold">
+                                          <p:stCondLst>
+                                            <p:cond delay="0"/>
+                                          </p:stCondLst>
+                                        </p:cTn>
+                                        <p:tgtEl>
+                                          <p:spTgt spid="3">
+                                            <p:txEl>
+                                              <p:pRg st="1" end="1"/>
+                                            </p:txEl>
+                                          </p:spTgt>
+                                        </p:tgtEl>
+                                        <p:attrNameLst>
+                                          <p:attrName>style.visibility</p:attrName>
+                                        </p:attrNameLst>
+                                      </p:cBhvr>
+                                      <p:to>
+                                        <p:strVal val="visible"/>
+                                      </p:to>
+                                    </p:set>
+                                    <p:animEffect transition="in" filter="fade">
+                                      <p:cBhvr>
+                                        <p:cTn id="12" dur="500"/>
+                                        <p:tgtEl>
+                                          <p:spTgt spid="3">
+                                            <p:txEl>
+                                              <p:pRg st="1" end="1"/>
+                                            </p:txEl>
+                                          </p:spTgt>
+                                        </p:tgtEl>
+                                      </p:cBhvr>
+                                    </p:animEffect>
+                                  </p:childTnLst>
+                                </p:cTn>
+                              </p:par>
+                            </p:childTnLst>
+                          </p:cTn>
+                        </p:par>
+                      </p:childTnLst>
+                    </p:cTn>
+                  </p:par>
+                  <p:par>
+                    <p:cTn id="13" fill="hold">
+                      <p:stCondLst>
+                        <p:cond delay="indefinite"/>
+                      </p:stCondLst>
+                      <p:childTnLst>
+                        <p:par>
+                          <p:cTn id="14" fill="hold">
+                            <p:stCondLst>
+                              <p:cond delay="0"/>
+                            </p:stCondLst>
+                            <p:childTnLst>
+                              <p:par>
+                                <p:cTn id="15" presetID="10" presetClass="entr" presetSubtype="0" fill="hold" grpId="0" nodeType="clickEffect">
+                                  <p:stCondLst>
+                                    <p:cond delay="0"/>
+                                  </p:stCondLst>
+                                  <p:childTnLst>
+                                    <p:set>
+                                      <p:cBhvr>
+                                        <p:cTn id="16" dur="1" fill="hold">
+                                          <p:stCondLst>
+                                            <p:cond delay="0"/>
+                                          </p:stCondLst>
+                                        </p:cTn>
+                                        <p:tgtEl>
+                                          <p:spTgt spid="3">
+                                            <p:txEl>
+                                              <p:pRg st="2" end="2"/>
+                                            </p:txEl>
+                                          </p:spTgt>
+                                        </p:tgtEl>
+                                        <p:attrNameLst>
+                                          <p:attrName>style.visibility</p:attrName>
+                                        </p:attrNameLst>
+                                      </p:cBhvr>
+                                      <p:to>
+                                        <p:strVal val="visible"/>
+                                      </p:to>
+                                    </p:set>
+                                    <p:animEffect transition="in" filter="fade">
+                                      <p:cBhvr>
+                                        <p:cTn id="17" dur="500"/>
+                                        <p:tgtEl>
+                                          <p:spTgt spid="3">
+                                            <p:txEl>
+                                              <p:pRg st="2" end="2"/>
+                                            </p:txEl>
+                                          </p:spTgt>
+                                        </p:tgtEl>
+                                      </p:cBhvr>
+                                    </p:animEffect>
+                                  </p:childTnLst>
+                                </p:cTn>
+                              </p:par>
+                            </p:childTnLst>
+                          </p:cTn>
+                        </p:par>
+                      </p:childTnLst>
+                    </p:cTn>
+                  </p:par>
+                  <p:par>
+                    <p:cTn id="18" fill="hold">
+                      <p:stCondLst>
+                        <p:cond delay="indefinite"/>
+                      </p:stCondLst>
+                      <p:childTnLst>
+                        <p:par>
+                          <p:cTn id="19" fill="hold">
+                            <p:stCondLst>
+                              <p:cond delay="0"/>
+                            </p:stCondLst>
+                            <p:childTnLst>
+                              <p:par>
+                                <p:cTn id="20" presetID="10" presetClass="entr" presetSubtype="0" fill="hold" grpId="0" nodeType="clickEffect">
+                                  <p:stCondLst>
+                                    <p:cond delay="0"/>
+                                  </p:stCondLst>
+                                  <p:childTnLst>
+                                    <p:set>
+                                      <p:cBhvr>
+                                        <p:cTn id="21" dur="1" fill="hold">
+                                          <p:stCondLst>
+                                            <p:cond delay="0"/>
+                                          </p:stCondLst>
+                                        </p:cTn>
+                                        <p:tgtEl>
+                                          <p:spTgt spid="3">
+                                            <p:txEl>
+                                              <p:pRg st="3" end="3"/>
+                                            </p:txEl>
+                                          </p:spTgt>
+                                        </p:tgtEl>
+                                        <p:attrNameLst>
+                                          <p:attrName>style.visibility</p:attrName>
+                                        </p:attrNameLst>
+                                      </p:cBhvr>
+                                      <p:to>
+                                        <p:strVal val="visible"/>
+                                      </p:to>
+                                    </p:set>
+                                    <p:animEffect transition="in" filter="fade">
+                                      <p:cBhvr>
+                                        <p:cTn id="22" dur="500"/>
+                                        <p:tgtEl>
+                                          <p:spTgt spid="3">
+                                            <p:txEl>
+                                              <p:pRg st="3" end="3"/>
+                                            </p:txEl>
+                                          </p:spTgt>
+                                        </p:tgtEl>
+                                      </p:cBhvr>
+                                    </p:animEffect>
+                                  </p:childTnLst>
+                                </p:cTn>
+                              </p:par>
+                            </p:childTnLst>
+                          </p:cTn>
+                        </p:par>
+                      </p:childTnLst>
+                    </p:cTn>
+                  </p:par>
+                  <p:par>
+                    <p:cTn id="23" fill="hold">
+                      <p:stCondLst>
+                        <p:cond delay="indefinite"/>
+                      </p:stCondLst>
+                      <p:childTnLst>
+                        <p:par>
+                          <p:cTn id="24" fill="hold">
+                            <p:stCondLst>
+                              <p:cond delay="0"/>
+                            </p:stCondLst>
+                            <p:childTnLst>
+                              <p:par>
+                                <p:cTn id="25" presetID="10" presetClass="entr" presetSubtype="0" fill="hold" grpId="0" nodeType="clickEffect">
+                                  <p:stCondLst>
+                                    <p:cond delay="0"/>
+                                  </p:stCondLst>
+                                  <p:childTnLst>
+                                    <p:set>
+                                      <p:cBhvr>
+                                        <p:cTn id="26" dur="1" fill="hold">
+                                          <p:stCondLst>
+                                            <p:cond delay="0"/>
+                                          </p:stCondLst>
+                                        </p:cTn>
+                                        <p:tgtEl>
+                                          <p:spTgt spid="3">
+                                            <p:txEl>
+                                              <p:pRg st="4" end="4"/>
+                                            </p:txEl>
+                                          </p:spTgt>
+                                        </p:tgtEl>
+                                        <p:attrNameLst>
+                                          <p:attrName>style.visibility</p:attrName>
+                                        </p:attrNameLst>
+                                      </p:cBhvr>
+                                      <p:to>
+                                        <p:strVal val="visible"/>
+                                      </p:to>
+                                    </p:set>
+                                    <p:animEffect transition="in" filter="fade">
+                                      <p:cBhvr>
+                                        <p:cTn id="27" dur="500"/>
+                                        <p:tgtEl>
+                                          <p:spTgt spid="3">
+                                            <p:txEl>
+                                              <p:pRg st="4" end="4"/>
+                                            </p:txEl>
+                                          </p:spTgt>
+                                        </p:tgtEl>
+                                      </p:cBhvr>
+                                    </p:animEffect>
+                                  </p:childTnLst>
+                                </p:cTn>
+                              </p:par>
+                            </p:childTnLst>
+                          </p:cTn>
+                        </p:par>
+                      </p:childTnLst>
+                    </p:cTn>
+                  </p:par>
+                  <p:par>
+                    <p:cTn id="28" fill="hold">
+                      <p:stCondLst>
+                        <p:cond delay="indefinite"/>
+                      </p:stCondLst>
+                      <p:childTnLst>
+                        <p:par>
+                          <p:cTn id="29" fill="hold">
+                            <p:stCondLst>
+                              <p:cond delay="0"/>
+                            </p:stCondLst>
+                            <p:childTnLst>
+                              <p:par>
+                                <p:cTn id="30" presetID="10" presetClass="entr" presetSubtype="0" fill="hold" grpId="0" nodeType="clickEffect">
+                                  <p:stCondLst>
+                                    <p:cond delay="0"/>
+                                  </p:stCondLst>
+                                  <p:childTnLst>
+                                    <p:set>
+                                      <p:cBhvr>
+                                        <p:cTn id="31" dur="1" fill="hold">
+                                          <p:stCondLst>
+                                            <p:cond delay="0"/>
+                                          </p:stCondLst>
+                                        </p:cTn>
+                                        <p:tgtEl>
+                                          <p:spTgt spid="3">
+                                            <p:txEl>
+                                              <p:pRg st="5" end="5"/>
+                                            </p:txEl>
+                                          </p:spTgt>
+                                        </p:tgtEl>
+                                        <p:attrNameLst>
+                                          <p:attrName>style.visibility</p:attrName>
+                                        </p:attrNameLst>
+                                      </p:cBhvr>
+                                      <p:to>
+                                        <p:strVal val="visible"/>
+                                      </p:to>
+                                    </p:set>
+                                    <p:animEffect transition="in" filter="fade">
+                                      <p:cBhvr>
+                                        <p:cTn id="32" dur="500"/>
+                                        <p:tgtEl>
+                                          <p:spTgt spid="3">
+                                            <p:txEl>
+                                              <p:pRg st="5" end="5"/>
+                                            </p:txEl>
+                                          </p:spTgt>
+                                        </p:tgtEl>
+                                      </p:cBhvr>
+                                    </p:animEffect>
+                                  </p:childTnLst>
+                                </p:cTn>
+                              </p:par>
+                            </p:childTnLst>
+                          </p:cTn>
+                        </p:par>
+                      </p:childTnLst>
+                    </p:cTn>
+                  </p:par>
+                </p:childTnLst>
+              </p:cTn>
+              <p:prevCondLst>
+                <p:cond evt="onPrev" delay="0">
+                  <p:tgtEl>
+                    <p:sldTgt/>
+                  </p:tgtEl>
+                </p:cond>
+              </p:prevCondLst>
+              <p:nextCondLst>
+                <p:cond evt="onNext" delay="0">
+                  <p:tgtEl>
+                    <p:sldTgt/>
+                  </p:tgtEl>
+                </p:cond>
+              </p:nextCondLst>
+            </p:seq>
+          </p:childTnLst>
+        </p:cTn>
+      </p:par>
+    </p:tnLst>
+    <p:bldLst>
+      <p:bldP spid="3" grpId="0" build="p"/>
+    </p:bldLst>
+  </p:timing>
+</p:sld>
+</file>
+
+<file path=ppt/slides/slide5.xml><?xml version="1.0" encoding="utf-8"?>
+<p:sld xmlns:a="http://schemas.openxmlformats.org/drawingml/2006/main" xmlns:r="http://schemas.openxmlformats.org/officeDocument/2006/relationships" xmlns:p="http://schemas.openxmlformats.org/presentationml/2006/main">
+  <p:cSld>
+    <p:spTree>
+      <p:nvGrpSpPr>
+        <p:cNvPr id="1" name=""/>
+        <p:cNvGrpSpPr/>
+        <p:nvPr/>
+      </p:nvGrpSpPr>
+      <p:grpSpPr>
+        <a:xfrm>
+          <a:off x="0" y="0"/>
+          <a:ext cx="0" cy="0"/>
+          <a:chOff x="0" y="0"/>
+          <a:chExt cx="0" cy="0"/>
+        </a:xfrm>
+      </p:grpSpPr>
+      <p:sp>
+        <p:nvSpPr>
+          <p:cNvPr id="2" name="Title 1">
+            <a:extLst>
+              <a:ext uri="{FF2B5EF4-FFF2-40B4-BE49-F238E27FC236}">
+                <a16:creationId xmlns:a16="http://schemas.microsoft.com/office/drawing/2014/main" id="{795D0F40-1178-4916-A2E1-44482FE42472}"/>
+              </a:ext>
+            </a:extLst>
+          </p:cNvPr>
+          <p:cNvSpPr>
+            <a:spLocks noGrp="1"/>
+          </p:cNvSpPr>
+          <p:nvPr>
+            <p:ph type="title"/>
+          </p:nvPr>
+        </p:nvSpPr>
+        <p:spPr/>
+        <p:txBody>
+          <a:bodyPr/>
+          <a:lstStyle/>
+          <a:p>
+            <a:r>
+              <a:rPr lang="en-US" dirty="0"/>
+              <a:t>English to Predicate Logic</a:t>
+            </a:r>
+          </a:p>
+        </p:txBody>
+      </p:sp>
+      <p:sp>
+        <p:nvSpPr>
+          <p:cNvPr id="3" name="Content Placeholder 2">
+            <a:extLst>
+              <a:ext uri="{FF2B5EF4-FFF2-40B4-BE49-F238E27FC236}">
+                <a16:creationId xmlns:a16="http://schemas.microsoft.com/office/drawing/2014/main" id="{6DD2888E-A816-4213-A62D-8684E2EB2BA4}"/>
+              </a:ext>
+            </a:extLst>
+          </p:cNvPr>
+          <p:cNvSpPr>
+            <a:spLocks noGrp="1"/>
+          </p:cNvSpPr>
+          <p:nvPr>
+            <p:ph idx="1"/>
+          </p:nvPr>
+        </p:nvSpPr>
+        <p:spPr/>
+        <p:txBody>
+          <a:bodyPr/>
+          <a:lstStyle/>
+          <a:p>
+            <a:pPr marL="0" indent="0">
+              <a:buNone/>
+            </a:pPr>
+            <a:r>
+              <a:rPr lang="en-US" dirty="0"/>
+              <a:t>“For every real number x, there is a real number y such that y^2 = x”</a:t>
+            </a:r>
+          </a:p>
+          <a:p>
+            <a:pPr marL="0" indent="0">
+              <a:buNone/>
+            </a:pPr>
+            <a:r>
+              <a:rPr lang="en-US" dirty="0"/>
+              <a:t>If you are ahead in the text, note that we are assuming the set and ignore it</a:t>
+            </a:r>
+          </a:p>
+          <a:p>
+            <a:pPr marL="0" indent="0">
+              <a:buNone/>
+            </a:pPr>
+            <a:r>
+              <a:rPr lang="en-US" dirty="0"/>
+              <a:t>∀</a:t>
+            </a:r>
+            <a:r>
+              <a:rPr lang="en-US" dirty="0" err="1"/>
+              <a:t>x∃yP</a:t>
+            </a:r>
+            <a:r>
+              <a:rPr lang="en-US" dirty="0"/>
+              <a:t>(</a:t>
+            </a:r>
+            <a:r>
+              <a:rPr lang="en-US" dirty="0" err="1"/>
+              <a:t>x,y</a:t>
+            </a:r>
+            <a:r>
+              <a:rPr lang="en-US" dirty="0"/>
+              <a:t>) =&gt; y^2  = x</a:t>
+            </a:r>
+          </a:p>
+          <a:p>
+            <a:pPr marL="0" indent="0">
+              <a:buNone/>
+            </a:pPr>
+            <a:r>
+              <a:rPr lang="en-US" dirty="0"/>
+              <a:t>“Some zebras don’t have stripes”</a:t>
+            </a:r>
+          </a:p>
+          <a:p>
+            <a:pPr marL="0" indent="0">
+              <a:buNone/>
+            </a:pPr>
+            <a:r>
+              <a:rPr lang="en-US" dirty="0"/>
+              <a:t>∃</a:t>
+            </a:r>
+            <a:r>
+              <a:rPr lang="en-US" dirty="0" err="1"/>
+              <a:t>yS</a:t>
+            </a:r>
+            <a:r>
+              <a:rPr lang="en-US" dirty="0"/>
+              <a:t>(y) =&gt; y does not have stripes</a:t>
+            </a:r>
+          </a:p>
+        </p:txBody>
+      </p:sp>
+    </p:spTree>
+    <p:extLst>
+      <p:ext uri="{BB962C8B-B14F-4D97-AF65-F5344CB8AC3E}">
+        <p14:creationId xmlns:p14="http://schemas.microsoft.com/office/powerpoint/2010/main" val="3194843534"/>
+      </p:ext>
+    </p:extLst>
+  </p:cSld>
+  <p:clrMapOvr>
+    <a:masterClrMapping/>
+  </p:clrMapOvr>
+  <p:timing>
+    <p:tnLst>
+      <p:par>
+        <p:cTn id="1" dur="indefinite" restart="never" nodeType="tmRoot">
+          <p:childTnLst>
+            <p:seq concurrent="1" nextAc="seek">
+              <p:cTn id="2" dur="indefinite" nodeType="mainSeq">
+                <p:childTnLst>
+                  <p:par>
+                    <p:cTn id="3" fill="hold">
+                      <p:stCondLst>
+                        <p:cond delay="indefinite"/>
+                      </p:stCondLst>
+                      <p:childTnLst>
+                        <p:par>
+                          <p:cTn id="4" fill="hold">
+                            <p:stCondLst>
+                              <p:cond delay="0"/>
+                            </p:stCondLst>
+                            <p:childTnLst>
+                              <p:par>
+                                <p:cTn id="5" presetID="10" presetClass="entr" presetSubtype="0" fill="hold" grpId="0" nodeType="clickEffect">
+                                  <p:stCondLst>
+                                    <p:cond delay="0"/>
+                                  </p:stCondLst>
+                                  <p:childTnLst>
+                                    <p:set>
+                                      <p:cBhvr>
+                                        <p:cTn id="6" dur="1" fill="hold">
+                                          <p:stCondLst>
+                                            <p:cond delay="0"/>
+                                          </p:stCondLst>
+                                        </p:cTn>
+                                        <p:tgtEl>
+                                          <p:spTgt spid="3">
+                                            <p:txEl>
+                                              <p:pRg st="0" end="0"/>
+                                            </p:txEl>
+                                          </p:spTgt>
+                                        </p:tgtEl>
+                                        <p:attrNameLst>
+                                          <p:attrName>style.visibility</p:attrName>
+                                        </p:attrNameLst>
+                                      </p:cBhvr>
+                                      <p:to>
+                                        <p:strVal val="visible"/>
+                                      </p:to>
+                                    </p:set>
+                                    <p:animEffect transition="in" filter="fade">
+                                      <p:cBhvr>
+                                        <p:cTn id="7" dur="500"/>
+                                        <p:tgtEl>
+                                          <p:spTgt spid="3">
+                                            <p:txEl>
+                                              <p:pRg st="0" end="0"/>
+                                            </p:txEl>
+                                          </p:spTgt>
+                                        </p:tgtEl>
+                                      </p:cBhvr>
+                                    </p:animEffect>
+                                  </p:childTnLst>
+                                </p:cTn>
+                              </p:par>
+                            </p:childTnLst>
+                          </p:cTn>
+                        </p:par>
+                      </p:childTnLst>
+                    </p:cTn>
+                  </p:par>
+                  <p:par>
+                    <p:cTn id="8" fill="hold">
+                      <p:stCondLst>
+                        <p:cond delay="indefinite"/>
+                      </p:stCondLst>
+                      <p:childTnLst>
+                        <p:par>
+                          <p:cTn id="9" fill="hold">
+                            <p:stCondLst>
+                              <p:cond delay="0"/>
+                            </p:stCondLst>
+                            <p:childTnLst>
+                              <p:par>
+                                <p:cTn id="10" presetID="10" presetClass="entr" presetSubtype="0" fill="hold" grpId="0" nodeType="clickEffect">
+                                  <p:stCondLst>
+                                    <p:cond delay="0"/>
+                                  </p:stCondLst>
+                                  <p:childTnLst>
+                                    <p:set>
+                                      <p:cBhvr>
+                                        <p:cTn id="11" dur="1" fill="hold">
+                                          <p:stCondLst>
+                                            <p:cond delay="0"/>
+                                          </p:stCondLst>
+                                        </p:cTn>
+                                        <p:tgtEl>
+                                          <p:spTgt spid="3">
+                                            <p:txEl>
+                                              <p:pRg st="1" end="1"/>
+                                            </p:txEl>
+                                          </p:spTgt>
+                                        </p:tgtEl>
+                                        <p:attrNameLst>
+                                          <p:attrName>style.visibility</p:attrName>
+                                        </p:attrNameLst>
+                                      </p:cBhvr>
+                                      <p:to>
+                                        <p:strVal val="visible"/>
+                                      </p:to>
+                                    </p:set>
+                                    <p:animEffect transition="in" filter="fade">
+                                      <p:cBhvr>
+                                        <p:cTn id="12" dur="500"/>
+                                        <p:tgtEl>
+                                          <p:spTgt spid="3">
+                                            <p:txEl>
+                                              <p:pRg st="1" end="1"/>
+                                            </p:txEl>
+                                          </p:spTgt>
+                                        </p:tgtEl>
+                                      </p:cBhvr>
+                                    </p:animEffect>
+                                  </p:childTnLst>
+                                </p:cTn>
+                              </p:par>
+                            </p:childTnLst>
+                          </p:cTn>
+                        </p:par>
+                      </p:childTnLst>
+                    </p:cTn>
+                  </p:par>
+                  <p:par>
+                    <p:cTn id="13" fill="hold">
+                      <p:stCondLst>
+                        <p:cond delay="indefinite"/>
+                      </p:stCondLst>
+                      <p:childTnLst>
+                        <p:par>
+                          <p:cTn id="14" fill="hold">
+                            <p:stCondLst>
+                              <p:cond delay="0"/>
+                            </p:stCondLst>
+                            <p:childTnLst>
+                              <p:par>
+                                <p:cTn id="15" presetID="10" presetClass="entr" presetSubtype="0" fill="hold" grpId="0" nodeType="clickEffect">
+                                  <p:stCondLst>
+                                    <p:cond delay="0"/>
+                                  </p:stCondLst>
+                                  <p:childTnLst>
+                                    <p:set>
+                                      <p:cBhvr>
+                                        <p:cTn id="16" dur="1" fill="hold">
+                                          <p:stCondLst>
+                                            <p:cond delay="0"/>
+                                          </p:stCondLst>
+                                        </p:cTn>
+                                        <p:tgtEl>
+                                          <p:spTgt spid="3">
+                                            <p:txEl>
+                                              <p:pRg st="2" end="2"/>
+                                            </p:txEl>
+                                          </p:spTgt>
+                                        </p:tgtEl>
+                                        <p:attrNameLst>
+                                          <p:attrName>style.visibility</p:attrName>
+                                        </p:attrNameLst>
+                                      </p:cBhvr>
+                                      <p:to>
+                                        <p:strVal val="visible"/>
+                                      </p:to>
+                                    </p:set>
+                                    <p:animEffect transition="in" filter="fade">
+                                      <p:cBhvr>
+                                        <p:cTn id="17" dur="500"/>
+                                        <p:tgtEl>
+                                          <p:spTgt spid="3">
+                                            <p:txEl>
+                                              <p:pRg st="2" end="2"/>
+                                            </p:txEl>
+                                          </p:spTgt>
+                                        </p:tgtEl>
+                                      </p:cBhvr>
+                                    </p:animEffect>
+                                  </p:childTnLst>
+                                </p:cTn>
+                              </p:par>
+                            </p:childTnLst>
+                          </p:cTn>
+                        </p:par>
+                      </p:childTnLst>
+                    </p:cTn>
+                  </p:par>
+                  <p:par>
+                    <p:cTn id="18" fill="hold">
+                      <p:stCondLst>
+                        <p:cond delay="indefinite"/>
+                      </p:stCondLst>
+                      <p:childTnLst>
+                        <p:par>
+                          <p:cTn id="19" fill="hold">
+                            <p:stCondLst>
+                              <p:cond delay="0"/>
+                            </p:stCondLst>
+                            <p:childTnLst>
+                              <p:par>
+                                <p:cTn id="20" presetID="10" presetClass="entr" presetSubtype="0" fill="hold" grpId="0" nodeType="clickEffect">
+                                  <p:stCondLst>
+                                    <p:cond delay="0"/>
+                                  </p:stCondLst>
+                                  <p:childTnLst>
+                                    <p:set>
+                                      <p:cBhvr>
+                                        <p:cTn id="21" dur="1" fill="hold">
+                                          <p:stCondLst>
+                                            <p:cond delay="0"/>
+                                          </p:stCondLst>
+                                        </p:cTn>
+                                        <p:tgtEl>
+                                          <p:spTgt spid="3">
+                                            <p:txEl>
+                                              <p:pRg st="3" end="3"/>
+                                            </p:txEl>
+                                          </p:spTgt>
+                                        </p:tgtEl>
+                                        <p:attrNameLst>
+                                          <p:attrName>style.visibility</p:attrName>
+                                        </p:attrNameLst>
+                                      </p:cBhvr>
+                                      <p:to>
+                                        <p:strVal val="visible"/>
+                                      </p:to>
+                                    </p:set>
+                                    <p:animEffect transition="in" filter="fade">
+                                      <p:cBhvr>
+                                        <p:cTn id="22" dur="500"/>
+                                        <p:tgtEl>
+                                          <p:spTgt spid="3">
+                                            <p:txEl>
+                                              <p:pRg st="3" end="3"/>
+                                            </p:txEl>
+                                          </p:spTgt>
+                                        </p:tgtEl>
+                                      </p:cBhvr>
+                                    </p:animEffect>
+                                  </p:childTnLst>
+                                </p:cTn>
+                              </p:par>
+                            </p:childTnLst>
+                          </p:cTn>
+                        </p:par>
+                      </p:childTnLst>
+                    </p:cTn>
+                  </p:par>
+                  <p:par>
+                    <p:cTn id="23" fill="hold">
+                      <p:stCondLst>
+                        <p:cond delay="indefinite"/>
+                      </p:stCondLst>
+                      <p:childTnLst>
+                        <p:par>
+                          <p:cTn id="24" fill="hold">
+                            <p:stCondLst>
+                              <p:cond delay="0"/>
+                            </p:stCondLst>
+                            <p:childTnLst>
+                              <p:par>
+                                <p:cTn id="25" presetID="10" presetClass="entr" presetSubtype="0" fill="hold" grpId="0" nodeType="clickEffect">
+                                  <p:stCondLst>
+                                    <p:cond delay="0"/>
+                                  </p:stCondLst>
+                                  <p:childTnLst>
+                                    <p:set>
+                                      <p:cBhvr>
+                                        <p:cTn id="26" dur="1" fill="hold">
+                                          <p:stCondLst>
+                                            <p:cond delay="0"/>
+                                          </p:stCondLst>
+                                        </p:cTn>
+                                        <p:tgtEl>
+                                          <p:spTgt spid="3">
+                                            <p:txEl>
+                                              <p:pRg st="4" end="4"/>
+                                            </p:txEl>
+                                          </p:spTgt>
+                                        </p:tgtEl>
+                                        <p:attrNameLst>
+                                          <p:attrName>style.visibility</p:attrName>
+                                        </p:attrNameLst>
+                                      </p:cBhvr>
+                                      <p:to>
+                                        <p:strVal val="visible"/>
+                                      </p:to>
+                                    </p:set>
+                                    <p:animEffect transition="in" filter="fade">
+                                      <p:cBhvr>
+                                        <p:cTn id="27" dur="500"/>
+                                        <p:tgtEl>
+                                          <p:spTgt spid="3">
+                                            <p:txEl>
+                                              <p:pRg st="4" end="4"/>
+                                            </p:txEl>
+                                          </p:spTgt>
+                                        </p:tgtEl>
+                                      </p:cBhvr>
+                                    </p:animEffect>
+                                  </p:childTnLst>
+                                </p:cTn>
+                              </p:par>
+                            </p:childTnLst>
+                          </p:cTn>
+                        </p:par>
+                      </p:childTnLst>
+                    </p:cTn>
+                  </p:par>
+                </p:childTnLst>
+              </p:cTn>
+              <p:prevCondLst>
+                <p:cond evt="onPrev" delay="0">
+                  <p:tgtEl>
+                    <p:sldTgt/>
+                  </p:tgtEl>
+                </p:cond>
+              </p:prevCondLst>
+              <p:nextCondLst>
+                <p:cond evt="onNext" delay="0">
+                  <p:tgtEl>
+                    <p:sldTgt/>
+                  </p:tgtEl>
+                </p:cond>
+              </p:nextCondLst>
+            </p:seq>
+          </p:childTnLst>
+        </p:cTn>
+      </p:par>
+    </p:tnLst>
+    <p:bldLst>
+      <p:bldP spid="3" grpId="0" build="p"/>
+    </p:bldLst>
+  </p:timing>
+</p:sld>
+</file>
+
+<file path=ppt/slides/slide6.xml><?xml version="1.0" encoding="utf-8"?>
+<p:sld xmlns:a="http://schemas.openxmlformats.org/drawingml/2006/main" xmlns:r="http://schemas.openxmlformats.org/officeDocument/2006/relationships" xmlns:p="http://schemas.openxmlformats.org/presentationml/2006/main">
+  <p:cSld>
+    <p:spTree>
+      <p:nvGrpSpPr>
+        <p:cNvPr id="1" name=""/>
+        <p:cNvGrpSpPr/>
+        <p:nvPr/>
+      </p:nvGrpSpPr>
+      <p:grpSpPr>
+        <a:xfrm>
+          <a:off x="0" y="0"/>
+          <a:ext cx="0" cy="0"/>
+          <a:chOff x="0" y="0"/>
+          <a:chExt cx="0" cy="0"/>
+        </a:xfrm>
+      </p:grpSpPr>
+      <p:sp>
+        <p:nvSpPr>
+          <p:cNvPr id="2" name="Title 1">
+            <a:extLst>
+              <a:ext uri="{FF2B5EF4-FFF2-40B4-BE49-F238E27FC236}">
+                <a16:creationId xmlns:a16="http://schemas.microsoft.com/office/drawing/2014/main" id="{564BA960-7E16-44B2-B3BE-3D165189ADA9}"/>
+              </a:ext>
+            </a:extLst>
+          </p:cNvPr>
+          <p:cNvSpPr>
+            <a:spLocks noGrp="1"/>
+          </p:cNvSpPr>
+          <p:nvPr>
+            <p:ph type="title"/>
+          </p:nvPr>
+        </p:nvSpPr>
+        <p:spPr/>
+        <p:txBody>
+          <a:bodyPr/>
+          <a:lstStyle/>
+          <a:p>
+            <a:r>
+              <a:rPr lang="en-US" dirty="0"/>
+              <a:t>Now add connectors</a:t>
+            </a:r>
+          </a:p>
+        </p:txBody>
+      </p:sp>
+      <p:sp>
+        <p:nvSpPr>
+          <p:cNvPr id="3" name="Content Placeholder 2">
+            <a:extLst>
+              <a:ext uri="{FF2B5EF4-FFF2-40B4-BE49-F238E27FC236}">
+                <a16:creationId xmlns:a16="http://schemas.microsoft.com/office/drawing/2014/main" id="{875C6499-D161-4B99-9298-29C385F0C44E}"/>
+              </a:ext>
+            </a:extLst>
+          </p:cNvPr>
+          <p:cNvSpPr>
+            <a:spLocks noGrp="1"/>
+          </p:cNvSpPr>
+          <p:nvPr>
+            <p:ph idx="1"/>
+          </p:nvPr>
+        </p:nvSpPr>
+        <p:spPr/>
+        <p:txBody>
+          <a:bodyPr>
+            <a:normAutofit fontScale="92500" lnSpcReduction="10000"/>
+          </a:bodyPr>
+          <a:lstStyle/>
+          <a:p>
+            <a:pPr marL="0" indent="0">
+              <a:buNone/>
+            </a:pPr>
+            <a:r>
+              <a:rPr lang="en-US" dirty="0"/>
+              <a:t>Given O(</a:t>
+            </a:r>
+            <a:r>
+              <a:rPr lang="en-US" dirty="0" err="1"/>
+              <a:t>x,y</a:t>
+            </a:r>
+            <a:r>
+              <a:rPr lang="en-US" dirty="0"/>
+              <a:t>) =&gt; x is older than y, P(x) =&gt; x is a person, D(x) = &gt; x is a dog</a:t>
+            </a:r>
+          </a:p>
+          <a:p>
+            <a:pPr marL="0" indent="0">
+              <a:buNone/>
+            </a:pPr>
+            <a:r>
+              <a:rPr lang="en-US" dirty="0"/>
+              <a:t>“All people are older than all dogs”</a:t>
+            </a:r>
+          </a:p>
+          <a:p>
+            <a:pPr marL="0" indent="0">
+              <a:buNone/>
+            </a:pPr>
+            <a:r>
+              <a:rPr lang="en-US" dirty="0"/>
+              <a:t>∀x[P(x) -&gt; ∀y(D(y) -&gt; O(</a:t>
+            </a:r>
+            <a:r>
+              <a:rPr lang="en-US" dirty="0" err="1"/>
+              <a:t>x,y</a:t>
+            </a:r>
+            <a:r>
+              <a:rPr lang="en-US" dirty="0"/>
+              <a:t>))]</a:t>
+            </a:r>
+          </a:p>
+          <a:p>
+            <a:pPr marL="0" indent="0">
+              <a:buNone/>
+            </a:pPr>
+            <a:r>
+              <a:rPr lang="en-US" dirty="0"/>
+              <a:t>“Some people are older than all dogs”</a:t>
+            </a:r>
+          </a:p>
+          <a:p>
+            <a:pPr marL="0" indent="0">
+              <a:buNone/>
+            </a:pPr>
+            <a:r>
+              <a:rPr lang="en-US" dirty="0"/>
+              <a:t>∃x[P(x) -&gt; ∀y(D(y) -&gt; O(</a:t>
+            </a:r>
+            <a:r>
+              <a:rPr lang="en-US" dirty="0" err="1"/>
+              <a:t>x,y</a:t>
+            </a:r>
+            <a:r>
+              <a:rPr lang="en-US" dirty="0"/>
+              <a:t>))]</a:t>
+            </a:r>
+          </a:p>
+          <a:p>
+            <a:pPr marL="0" indent="0">
+              <a:buNone/>
+            </a:pPr>
+            <a:r>
+              <a:rPr lang="en-US" dirty="0"/>
+              <a:t>“Some dogs are older than some people”</a:t>
+            </a:r>
+          </a:p>
+          <a:p>
+            <a:pPr marL="0" indent="0">
+              <a:buNone/>
+            </a:pPr>
+            <a:r>
+              <a:rPr lang="en-US" dirty="0"/>
+              <a:t>∃x[D(x) -&gt; ∃y(P(y) -&gt; O(</a:t>
+            </a:r>
+            <a:r>
+              <a:rPr lang="en-US" dirty="0" err="1"/>
+              <a:t>x,y</a:t>
+            </a:r>
+            <a:r>
+              <a:rPr lang="en-US" dirty="0"/>
+              <a:t>))]</a:t>
+            </a:r>
+          </a:p>
+        </p:txBody>
+      </p:sp>
+    </p:spTree>
+    <p:extLst>
+      <p:ext uri="{BB962C8B-B14F-4D97-AF65-F5344CB8AC3E}">
+        <p14:creationId xmlns:p14="http://schemas.microsoft.com/office/powerpoint/2010/main" val="3823564834"/>
+      </p:ext>
+    </p:extLst>
+  </p:cSld>
+  <p:clrMapOvr>
+    <a:masterClrMapping/>
+  </p:clrMapOvr>
+  <p:timing>
+    <p:tnLst>
+      <p:par>
+        <p:cTn id="1" dur="indefinite" restart="never" nodeType="tmRoot">
+          <p:childTnLst>
+            <p:seq concurrent="1" nextAc="seek">
+              <p:cTn id="2" dur="indefinite" nodeType="mainSeq">
+                <p:childTnLst>
+                  <p:par>
+                    <p:cTn id="3" fill="hold">
+                      <p:stCondLst>
+                        <p:cond delay="indefinite"/>
+                      </p:stCondLst>
+                      <p:childTnLst>
+                        <p:par>
+                          <p:cTn id="4" fill="hold">
+                            <p:stCondLst>
+                              <p:cond delay="0"/>
+                            </p:stCondLst>
+                            <p:childTnLst>
+                              <p:par>
+                                <p:cTn id="5" presetID="10" presetClass="entr" presetSubtype="0" fill="hold" grpId="0" nodeType="clickEffect">
+                                  <p:stCondLst>
+                                    <p:cond delay="0"/>
+                                  </p:stCondLst>
+                                  <p:childTnLst>
+                                    <p:set>
+                                      <p:cBhvr>
+                                        <p:cTn id="6" dur="1" fill="hold">
+                                          <p:stCondLst>
+                                            <p:cond delay="0"/>
+                                          </p:stCondLst>
+                                        </p:cTn>
+                                        <p:tgtEl>
+                                          <p:spTgt spid="3">
+                                            <p:txEl>
+                                              <p:pRg st="0" end="0"/>
+                                            </p:txEl>
+                                          </p:spTgt>
+                                        </p:tgtEl>
+                                        <p:attrNameLst>
+                                          <p:attrName>style.visibility</p:attrName>
+                                        </p:attrNameLst>
+                                      </p:cBhvr>
+                                      <p:to>
+                                        <p:strVal val="visible"/>
+                                      </p:to>
+                                    </p:set>
+                                    <p:animEffect transition="in" filter="fade">
+                                      <p:cBhvr>
+                                        <p:cTn id="7" dur="500"/>
+                                        <p:tgtEl>
+                                          <p:spTgt spid="3">
+                                            <p:txEl>
+                                              <p:pRg st="0" end="0"/>
+                                            </p:txEl>
+                                          </p:spTgt>
+                                        </p:tgtEl>
+                                      </p:cBhvr>
+                                    </p:animEffect>
+                                  </p:childTnLst>
+                                </p:cTn>
+                              </p:par>
+                            </p:childTnLst>
+                          </p:cTn>
+                        </p:par>
+                      </p:childTnLst>
+                    </p:cTn>
+                  </p:par>
+                  <p:par>
+                    <p:cTn id="8" fill="hold">
+                      <p:stCondLst>
+                        <p:cond delay="indefinite"/>
+                      </p:stCondLst>
+                      <p:childTnLst>
+                        <p:par>
+                          <p:cTn id="9" fill="hold">
+                            <p:stCondLst>
+                              <p:cond delay="0"/>
+                            </p:stCondLst>
+                            <p:childTnLst>
+                              <p:par>
+                                <p:cTn id="10" presetID="10" presetClass="entr" presetSubtype="0" fill="hold" grpId="0" nodeType="clickEffect">
+                                  <p:stCondLst>
+                                    <p:cond delay="0"/>
+                                  </p:stCondLst>
+                                  <p:childTnLst>
+                                    <p:set>
+                                      <p:cBhvr>
+                                        <p:cTn id="11" dur="1" fill="hold">
+                                          <p:stCondLst>
+                                            <p:cond delay="0"/>
+                                          </p:stCondLst>
+                                        </p:cTn>
+                                        <p:tgtEl>
+                                          <p:spTgt spid="3">
+                                            <p:txEl>
+                                              <p:pRg st="1" end="1"/>
+                                            </p:txEl>
+                                          </p:spTgt>
+                                        </p:tgtEl>
+                                        <p:attrNameLst>
+                                          <p:attrName>style.visibility</p:attrName>
+                                        </p:attrNameLst>
+                                      </p:cBhvr>
+                                      <p:to>
+                                        <p:strVal val="visible"/>
+                                      </p:to>
+                                    </p:set>
+                                    <p:animEffect transition="in" filter="fade">
+                                      <p:cBhvr>
+                                        <p:cTn id="12" dur="500"/>
+                                        <p:tgtEl>
+                                          <p:spTgt spid="3">
+                                            <p:txEl>
+                                              <p:pRg st="1" end="1"/>
+                                            </p:txEl>
+                                          </p:spTgt>
+                                        </p:tgtEl>
+                                      </p:cBhvr>
+                                    </p:animEffect>
+                                  </p:childTnLst>
+                                </p:cTn>
+                              </p:par>
+                            </p:childTnLst>
+                          </p:cTn>
+                        </p:par>
+                      </p:childTnLst>
+                    </p:cTn>
+                  </p:par>
+                  <p:par>
+                    <p:cTn id="13" fill="hold">
+                      <p:stCondLst>
+                        <p:cond delay="indefinite"/>
+                      </p:stCondLst>
+                      <p:childTnLst>
+                        <p:par>
+                          <p:cTn id="14" fill="hold">
+                            <p:stCondLst>
+                              <p:cond delay="0"/>
+                            </p:stCondLst>
+                            <p:childTnLst>
+                              <p:par>
+                                <p:cTn id="15" presetID="10" presetClass="entr" presetSubtype="0" fill="hold" grpId="0" nodeType="clickEffect">
+                                  <p:stCondLst>
+                                    <p:cond delay="0"/>
+                                  </p:stCondLst>
+                                  <p:childTnLst>
+                                    <p:set>
+                                      <p:cBhvr>
+                                        <p:cTn id="16" dur="1" fill="hold">
+                                          <p:stCondLst>
+                                            <p:cond delay="0"/>
+                                          </p:stCondLst>
+                                        </p:cTn>
+                                        <p:tgtEl>
+                                          <p:spTgt spid="3">
+                                            <p:txEl>
+                                              <p:pRg st="2" end="2"/>
+                                            </p:txEl>
+                                          </p:spTgt>
+                                        </p:tgtEl>
+                                        <p:attrNameLst>
+                                          <p:attrName>style.visibility</p:attrName>
+                                        </p:attrNameLst>
+                                      </p:cBhvr>
+                                      <p:to>
+                                        <p:strVal val="visible"/>
+                                      </p:to>
+                                    </p:set>
+                                    <p:animEffect transition="in" filter="fade">
+                                      <p:cBhvr>
+                                        <p:cTn id="17" dur="500"/>
+                                        <p:tgtEl>
+                                          <p:spTgt spid="3">
+                                            <p:txEl>
+                                              <p:pRg st="2" end="2"/>
+                                            </p:txEl>
+                                          </p:spTgt>
+                                        </p:tgtEl>
+                                      </p:cBhvr>
+                                    </p:animEffect>
+                                  </p:childTnLst>
+                                </p:cTn>
+                              </p:par>
+                            </p:childTnLst>
+                          </p:cTn>
+                        </p:par>
+                      </p:childTnLst>
+                    </p:cTn>
+                  </p:par>
+                  <p:par>
+                    <p:cTn id="18" fill="hold">
+                      <p:stCondLst>
+                        <p:cond delay="indefinite"/>
+                      </p:stCondLst>
+                      <p:childTnLst>
+                        <p:par>
+                          <p:cTn id="19" fill="hold">
+                            <p:stCondLst>
+                              <p:cond delay="0"/>
+                            </p:stCondLst>
+                            <p:childTnLst>
+                              <p:par>
+                                <p:cTn id="20" presetID="10" presetClass="entr" presetSubtype="0" fill="hold" grpId="0" nodeType="clickEffect">
+                                  <p:stCondLst>
+                                    <p:cond delay="0"/>
+                                  </p:stCondLst>
+                                  <p:childTnLst>
+                                    <p:set>
+                                      <p:cBhvr>
+                                        <p:cTn id="21" dur="1" fill="hold">
+                                          <p:stCondLst>
+                                            <p:cond delay="0"/>
+                                          </p:stCondLst>
+                                        </p:cTn>
+                                        <p:tgtEl>
+                                          <p:spTgt spid="3">
+                                            <p:txEl>
+                                              <p:pRg st="3" end="3"/>
+                                            </p:txEl>
+                                          </p:spTgt>
+                                        </p:tgtEl>
+                                        <p:attrNameLst>
+                                          <p:attrName>style.visibility</p:attrName>
+                                        </p:attrNameLst>
+                                      </p:cBhvr>
+                                      <p:to>
+                                        <p:strVal val="visible"/>
+                                      </p:to>
+                                    </p:set>
+                                    <p:animEffect transition="in" filter="fade">
+                                      <p:cBhvr>
+                                        <p:cTn id="22" dur="500"/>
+                                        <p:tgtEl>
+                                          <p:spTgt spid="3">
+                                            <p:txEl>
+                                              <p:pRg st="3" end="3"/>
+                                            </p:txEl>
+                                          </p:spTgt>
+                                        </p:tgtEl>
+                                      </p:cBhvr>
+                                    </p:animEffect>
+                                  </p:childTnLst>
+                                </p:cTn>
+                              </p:par>
+                            </p:childTnLst>
+                          </p:cTn>
+                        </p:par>
+                      </p:childTnLst>
+                    </p:cTn>
+                  </p:par>
+                  <p:par>
+                    <p:cTn id="23" fill="hold">
+                      <p:stCondLst>
+                        <p:cond delay="indefinite"/>
+                      </p:stCondLst>
+                      <p:childTnLst>
+                        <p:par>
+                          <p:cTn id="24" fill="hold">
+                            <p:stCondLst>
+                              <p:cond delay="0"/>
+                            </p:stCondLst>
+                            <p:childTnLst>
+                              <p:par>
+                                <p:cTn id="25" presetID="10" presetClass="entr" presetSubtype="0" fill="hold" grpId="0" nodeType="clickEffect">
+                                  <p:stCondLst>
+                                    <p:cond delay="0"/>
+                                  </p:stCondLst>
+                                  <p:childTnLst>
+                                    <p:set>
+                                      <p:cBhvr>
+                                        <p:cTn id="26" dur="1" fill="hold">
+                                          <p:stCondLst>
+                                            <p:cond delay="0"/>
+                                          </p:stCondLst>
+                                        </p:cTn>
+                                        <p:tgtEl>
+                                          <p:spTgt spid="3">
+                                            <p:txEl>
+                                              <p:pRg st="4" end="4"/>
+                                            </p:txEl>
+                                          </p:spTgt>
+                                        </p:tgtEl>
+                                        <p:attrNameLst>
+                                          <p:attrName>style.visibility</p:attrName>
+                                        </p:attrNameLst>
+                                      </p:cBhvr>
+                                      <p:to>
+                                        <p:strVal val="visible"/>
+                                      </p:to>
+                                    </p:set>
+                                    <p:animEffect transition="in" filter="fade">
+                                      <p:cBhvr>
+                                        <p:cTn id="27" dur="500"/>
+                                        <p:tgtEl>
+                                          <p:spTgt spid="3">
+                                            <p:txEl>
+                                              <p:pRg st="4" end="4"/>
+                                            </p:txEl>
+                                          </p:spTgt>
+                                        </p:tgtEl>
+                                      </p:cBhvr>
+                                    </p:animEffect>
+                                  </p:childTnLst>
+                                </p:cTn>
+                              </p:par>
+                            </p:childTnLst>
+                          </p:cTn>
+                        </p:par>
+                      </p:childTnLst>
+                    </p:cTn>
+                  </p:par>
+                  <p:par>
+                    <p:cTn id="28" fill="hold">
+                      <p:stCondLst>
+                        <p:cond delay="indefinite"/>
+                      </p:stCondLst>
+                      <p:childTnLst>
+                        <p:par>
+                          <p:cTn id="29" fill="hold">
+                            <p:stCondLst>
+                              <p:cond delay="0"/>
+                            </p:stCondLst>
+                            <p:childTnLst>
+                              <p:par>
+                                <p:cTn id="30" presetID="10" presetClass="entr" presetSubtype="0" fill="hold" grpId="0" nodeType="clickEffect">
+                                  <p:stCondLst>
+                                    <p:cond delay="0"/>
+                                  </p:stCondLst>
+                                  <p:childTnLst>
+                                    <p:set>
+                                      <p:cBhvr>
+                                        <p:cTn id="31" dur="1" fill="hold">
+                                          <p:stCondLst>
+                                            <p:cond delay="0"/>
+                                          </p:stCondLst>
+                                        </p:cTn>
+                                        <p:tgtEl>
+                                          <p:spTgt spid="3">
+                                            <p:txEl>
+                                              <p:pRg st="5" end="5"/>
+                                            </p:txEl>
+                                          </p:spTgt>
+                                        </p:tgtEl>
+                                        <p:attrNameLst>
+                                          <p:attrName>style.visibility</p:attrName>
+                                        </p:attrNameLst>
+                                      </p:cBhvr>
+                                      <p:to>
+                                        <p:strVal val="visible"/>
+                                      </p:to>
+                                    </p:set>
+                                    <p:animEffect transition="in" filter="fade">
+                                      <p:cBhvr>
+                                        <p:cTn id="32" dur="500"/>
+                                        <p:tgtEl>
+                                          <p:spTgt spid="3">
+                                            <p:txEl>
+                                              <p:pRg st="5" end="5"/>
+                                            </p:txEl>
+                                          </p:spTgt>
+                                        </p:tgtEl>
+                                      </p:cBhvr>
+                                    </p:animEffect>
+                                  </p:childTnLst>
+                                </p:cTn>
+                              </p:par>
+                            </p:childTnLst>
+                          </p:cTn>
+                        </p:par>
+                      </p:childTnLst>
+                    </p:cTn>
+                  </p:par>
+                  <p:par>
+                    <p:cTn id="33" fill="hold">
+                      <p:stCondLst>
+                        <p:cond delay="indefinite"/>
+                      </p:stCondLst>
+                      <p:childTnLst>
+                        <p:par>
+                          <p:cTn id="34" fill="hold">
+                            <p:stCondLst>
+                              <p:cond delay="0"/>
+                            </p:stCondLst>
+                            <p:childTnLst>
+                              <p:par>
+                                <p:cTn id="35" presetID="10" presetClass="entr" presetSubtype="0" fill="hold" grpId="0" nodeType="clickEffect">
+                                  <p:stCondLst>
+                                    <p:cond delay="0"/>
+                                  </p:stCondLst>
+                                  <p:childTnLst>
+                                    <p:set>
+                                      <p:cBhvr>
+                                        <p:cTn id="36" dur="1" fill="hold">
+                                          <p:stCondLst>
+                                            <p:cond delay="0"/>
+                                          </p:stCondLst>
+                                        </p:cTn>
+                                        <p:tgtEl>
+                                          <p:spTgt spid="3">
+                                            <p:txEl>
+                                              <p:pRg st="6" end="6"/>
+                                            </p:txEl>
+                                          </p:spTgt>
+                                        </p:tgtEl>
+                                        <p:attrNameLst>
+                                          <p:attrName>style.visibility</p:attrName>
+                                        </p:attrNameLst>
+                                      </p:cBhvr>
+                                      <p:to>
+                                        <p:strVal val="visible"/>
+                                      </p:to>
+                                    </p:set>
+                                    <p:animEffect transition="in" filter="fade">
+                                      <p:cBhvr>
+                                        <p:cTn id="37" dur="500"/>
+                                        <p:tgtEl>
+                                          <p:spTgt spid="3">
+                                            <p:txEl>
+                                              <p:pRg st="6" end="6"/>
+                                            </p:txEl>
+                                          </p:spTgt>
+                                        </p:tgtEl>
+                                      </p:cBhvr>
+                                    </p:animEffect>
+                                  </p:childTnLst>
+                                </p:cTn>
+                              </p:par>
+                            </p:childTnLst>
+                          </p:cTn>
+                        </p:par>
+                      </p:childTnLst>
+                    </p:cTn>
+                  </p:par>
+                </p:childTnLst>
+              </p:cTn>
+              <p:prevCondLst>
+                <p:cond evt="onPrev" delay="0">
+                  <p:tgtEl>
+                    <p:sldTgt/>
+                  </p:tgtEl>
+                </p:cond>
+              </p:prevCondLst>
+              <p:nextCondLst>
+                <p:cond evt="onNext" delay="0">
+                  <p:tgtEl>
+                    <p:sldTgt/>
+                  </p:tgtEl>
+                </p:cond>
+              </p:nextCondLst>
+            </p:seq>
+          </p:childTnLst>
+        </p:cTn>
+      </p:par>
+    </p:tnLst>
+    <p:bldLst>
+      <p:bldP spid="3" grpId="0" build="p"/>
+    </p:bldLst>
+  </p:timing>
+</p:sld>
+</file>
+
+<file path=ppt/slides/slide7.xml><?xml version="1.0" encoding="utf-8"?>
+<p:sld xmlns:a="http://schemas.openxmlformats.org/drawingml/2006/main" xmlns:r="http://schemas.openxmlformats.org/officeDocument/2006/relationships" xmlns:p="http://schemas.openxmlformats.org/presentationml/2006/main">
+  <p:cSld>
+    <p:spTree>
+      <p:nvGrpSpPr>
+        <p:cNvPr id="1" name=""/>
+        <p:cNvGrpSpPr/>
+        <p:nvPr/>
+      </p:nvGrpSpPr>
+      <p:grpSpPr>
+        <a:xfrm>
+          <a:off x="0" y="0"/>
+          <a:ext cx="0" cy="0"/>
+          <a:chOff x="0" y="0"/>
+          <a:chExt cx="0" cy="0"/>
+        </a:xfrm>
+      </p:grpSpPr>
+      <p:sp>
+        <p:nvSpPr>
+          <p:cNvPr id="2" name="Title 1">
+            <a:extLst>
+              <a:ext uri="{FF2B5EF4-FFF2-40B4-BE49-F238E27FC236}">
+                <a16:creationId xmlns:a16="http://schemas.microsoft.com/office/drawing/2014/main" id="{564BA960-7E16-44B2-B3BE-3D165189ADA9}"/>
+              </a:ext>
+            </a:extLst>
+          </p:cNvPr>
+          <p:cNvSpPr>
+            <a:spLocks noGrp="1"/>
+          </p:cNvSpPr>
+          <p:nvPr>
+            <p:ph type="title"/>
+          </p:nvPr>
+        </p:nvSpPr>
+        <p:spPr/>
+        <p:txBody>
+          <a:bodyPr/>
+          <a:lstStyle/>
+          <a:p>
+            <a:r>
+              <a:rPr lang="en-US" dirty="0"/>
+              <a:t>Now add connectors</a:t>
+            </a:r>
+          </a:p>
+        </p:txBody>
+      </p:sp>
+      <p:sp>
+        <p:nvSpPr>
+          <p:cNvPr id="3" name="Content Placeholder 2">
+            <a:extLst>
+              <a:ext uri="{FF2B5EF4-FFF2-40B4-BE49-F238E27FC236}">
+                <a16:creationId xmlns:a16="http://schemas.microsoft.com/office/drawing/2014/main" id="{875C6499-D161-4B99-9298-29C385F0C44E}"/>
+              </a:ext>
+            </a:extLst>
+          </p:cNvPr>
+          <p:cNvSpPr>
+            <a:spLocks noGrp="1"/>
+          </p:cNvSpPr>
+          <p:nvPr>
+            <p:ph idx="1"/>
+          </p:nvPr>
+        </p:nvSpPr>
+        <p:spPr/>
+        <p:txBody>
+          <a:bodyPr>
+            <a:normAutofit fontScale="70000" lnSpcReduction="20000"/>
+          </a:bodyPr>
+          <a:lstStyle/>
+          <a:p>
+            <a:pPr marL="0" indent="0">
+              <a:buNone/>
+            </a:pPr>
+            <a:r>
+              <a:rPr lang="en-US" dirty="0"/>
+              <a:t>Every dog is either happy or furry</a:t>
+            </a:r>
+          </a:p>
+          <a:p>
+            <a:pPr marL="0" indent="0">
+              <a:buNone/>
+            </a:pPr>
+            <a:r>
+              <a:rPr lang="en-US" dirty="0"/>
+              <a:t>D(x) =&gt; x is a dog, H(x) =&gt; x is harry, F(x) =&gt; x is furry</a:t>
+            </a:r>
+          </a:p>
+          <a:p>
+            <a:pPr marL="0" indent="0">
+              <a:buNone/>
+            </a:pPr>
+            <a:r>
+              <a:rPr lang="en-US" dirty="0"/>
+              <a:t>∀x[D(x) -&gt; [H(x) v F(x)]]</a:t>
+            </a:r>
+          </a:p>
+          <a:p>
+            <a:pPr marL="0" indent="0">
+              <a:buNone/>
+            </a:pPr>
+            <a:r>
+              <a:rPr lang="en-US" dirty="0"/>
+              <a:t>Some aliens are scary and from Mars</a:t>
+            </a:r>
+          </a:p>
+          <a:p>
+            <a:pPr marL="0" indent="0">
+              <a:buNone/>
+            </a:pPr>
+            <a:r>
+              <a:rPr lang="en-US" dirty="0"/>
+              <a:t>A(x) =&gt; x is an alien, S(x) =&gt; x is scary, M(x) =&gt; x is </a:t>
+            </a:r>
+            <a:r>
+              <a:rPr lang="en-US" dirty="0" err="1"/>
+              <a:t>martian</a:t>
+            </a:r>
+            <a:endParaRPr lang="en-US" dirty="0"/>
+          </a:p>
+          <a:p>
+            <a:pPr marL="0" indent="0">
+              <a:buNone/>
+            </a:pPr>
+            <a:r>
+              <a:rPr lang="en-US" dirty="0"/>
+              <a:t>∀x[A(x) -&gt; [S(x) ^ M(x)]]</a:t>
+            </a:r>
+          </a:p>
+          <a:p>
+            <a:pPr marL="0" indent="0">
+              <a:buNone/>
+            </a:pPr>
+            <a:r>
+              <a:rPr lang="en-US" dirty="0"/>
+              <a:t>Every alien dog is either harry and scary or furry and from mars</a:t>
+            </a:r>
+          </a:p>
+          <a:p>
+            <a:pPr marL="0" indent="0">
+              <a:buNone/>
+            </a:pPr>
+            <a:r>
+              <a:rPr lang="en-US" dirty="0"/>
+              <a:t>∀x[D(x) -&gt; (H(x) ^ S(x)) v (F(x) ^ M(x))]</a:t>
+            </a:r>
+          </a:p>
+          <a:p>
+            <a:pPr marL="0" indent="0">
+              <a:buNone/>
+            </a:pPr>
+            <a:r>
+              <a:rPr lang="en-US" dirty="0"/>
+              <a:t>∀x∃</a:t>
+            </a:r>
+          </a:p>
+          <a:p>
+            <a:pPr marL="0" indent="0">
+              <a:buNone/>
+            </a:pPr>
+            <a:endParaRPr lang="en-US" dirty="0"/>
+          </a:p>
+        </p:txBody>
+      </p:sp>
+    </p:spTree>
+    <p:extLst>
+      <p:ext uri="{BB962C8B-B14F-4D97-AF65-F5344CB8AC3E}">
+        <p14:creationId xmlns:p14="http://schemas.microsoft.com/office/powerpoint/2010/main" val="3735373955"/>
+      </p:ext>
+    </p:extLst>
+  </p:cSld>
+  <p:clrMapOvr>
+    <a:masterClrMapping/>
+  </p:clrMapOvr>
+  <p:timing>
+    <p:tnLst>
+      <p:par>
+        <p:cTn id="1" dur="indefinite" restart="never" nodeType="tmRoot">
+          <p:childTnLst>
+            <p:seq concurrent="1" nextAc="seek">
+              <p:cTn id="2" dur="indefinite" nodeType="mainSeq">
+                <p:childTnLst>
+                  <p:par>
+                    <p:cTn id="3" fill="hold">
+                      <p:stCondLst>
+                        <p:cond delay="indefinite"/>
+                      </p:stCondLst>
+                      <p:childTnLst>
+                        <p:par>
+                          <p:cTn id="4" fill="hold">
+                            <p:stCondLst>
+                              <p:cond delay="0"/>
+                            </p:stCondLst>
+                            <p:childTnLst>
+                              <p:par>
+                                <p:cTn id="5" presetID="10" presetClass="entr" presetSubtype="0" fill="hold" grpId="0" nodeType="clickEffect">
+                                  <p:stCondLst>
+                                    <p:cond delay="0"/>
+                                  </p:stCondLst>
+                                  <p:childTnLst>
+                                    <p:set>
+                                      <p:cBhvr>
+                                        <p:cTn id="6" dur="1" fill="hold">
+                                          <p:stCondLst>
+                                            <p:cond delay="0"/>
+                                          </p:stCondLst>
+                                        </p:cTn>
+                                        <p:tgtEl>
+                                          <p:spTgt spid="3">
+                                            <p:txEl>
+                                              <p:pRg st="0" end="0"/>
+                                            </p:txEl>
+                                          </p:spTgt>
+                                        </p:tgtEl>
+                                        <p:attrNameLst>
+                                          <p:attrName>style.visibility</p:attrName>
+                                        </p:attrNameLst>
+                                      </p:cBhvr>
+                                      <p:to>
+                                        <p:strVal val="visible"/>
+                                      </p:to>
+                                    </p:set>
+                                    <p:animEffect transition="in" filter="fade">
+                                      <p:cBhvr>
+                                        <p:cTn id="7" dur="500"/>
+                                        <p:tgtEl>
+                                          <p:spTgt spid="3">
+                                            <p:txEl>
+                                              <p:pRg st="0" end="0"/>
+                                            </p:txEl>
+                                          </p:spTgt>
+                                        </p:tgtEl>
+                                      </p:cBhvr>
+                                    </p:animEffect>
+                                  </p:childTnLst>
+                                </p:cTn>
+                              </p:par>
+                            </p:childTnLst>
+                          </p:cTn>
+                        </p:par>
+                      </p:childTnLst>
+                    </p:cTn>
+                  </p:par>
+                  <p:par>
+                    <p:cTn id="8" fill="hold">
+                      <p:stCondLst>
+                        <p:cond delay="indefinite"/>
+                      </p:stCondLst>
+                      <p:childTnLst>
+                        <p:par>
+                          <p:cTn id="9" fill="hold">
+                            <p:stCondLst>
+                              <p:cond delay="0"/>
+                            </p:stCondLst>
+                            <p:childTnLst>
+                              <p:par>
+                                <p:cTn id="10" presetID="10" presetClass="entr" presetSubtype="0" fill="hold" grpId="0" nodeType="clickEffect">
+                                  <p:stCondLst>
+                                    <p:cond delay="0"/>
+                                  </p:stCondLst>
+                                  <p:childTnLst>
+                                    <p:set>
+                                      <p:cBhvr>
+                                        <p:cTn id="11" dur="1" fill="hold">
+                                          <p:stCondLst>
+                                            <p:cond delay="0"/>
+                                          </p:stCondLst>
+                                        </p:cTn>
+                                        <p:tgtEl>
+                                          <p:spTgt spid="3">
+                                            <p:txEl>
+                                              <p:pRg st="1" end="1"/>
+                                            </p:txEl>
+                                          </p:spTgt>
+                                        </p:tgtEl>
+                                        <p:attrNameLst>
+                                          <p:attrName>style.visibility</p:attrName>
+                                        </p:attrNameLst>
+                                      </p:cBhvr>
+                                      <p:to>
+                                        <p:strVal val="visible"/>
+                                      </p:to>
+                                    </p:set>
+                                    <p:animEffect transition="in" filter="fade">
+                                      <p:cBhvr>
+                                        <p:cTn id="12" dur="500"/>
+                                        <p:tgtEl>
+                                          <p:spTgt spid="3">
+                                            <p:txEl>
+                                              <p:pRg st="1" end="1"/>
+                                            </p:txEl>
+                                          </p:spTgt>
+                                        </p:tgtEl>
+                                      </p:cBhvr>
+                                    </p:animEffect>
+                                  </p:childTnLst>
+                                </p:cTn>
+                              </p:par>
+                            </p:childTnLst>
+                          </p:cTn>
+                        </p:par>
+                      </p:childTnLst>
+                    </p:cTn>
+                  </p:par>
+                  <p:par>
+                    <p:cTn id="13" fill="hold">
+                      <p:stCondLst>
+                        <p:cond delay="indefinite"/>
+                      </p:stCondLst>
+                      <p:childTnLst>
+                        <p:par>
+                          <p:cTn id="14" fill="hold">
+                            <p:stCondLst>
+                              <p:cond delay="0"/>
+                            </p:stCondLst>
+                            <p:childTnLst>
+                              <p:par>
+                                <p:cTn id="15" presetID="10" presetClass="entr" presetSubtype="0" fill="hold" grpId="0" nodeType="clickEffect">
+                                  <p:stCondLst>
+                                    <p:cond delay="0"/>
+                                  </p:stCondLst>
+                                  <p:childTnLst>
+                                    <p:set>
+                                      <p:cBhvr>
+                                        <p:cTn id="16" dur="1" fill="hold">
+                                          <p:stCondLst>
+                                            <p:cond delay="0"/>
+                                          </p:stCondLst>
+                                        </p:cTn>
+                                        <p:tgtEl>
+                                          <p:spTgt spid="3">
+                                            <p:txEl>
+                                              <p:pRg st="2" end="2"/>
+                                            </p:txEl>
+                                          </p:spTgt>
+                                        </p:tgtEl>
+                                        <p:attrNameLst>
+                                          <p:attrName>style.visibility</p:attrName>
+                                        </p:attrNameLst>
+                                      </p:cBhvr>
+                                      <p:to>
+                                        <p:strVal val="visible"/>
+                                      </p:to>
+                                    </p:set>
+                                    <p:animEffect transition="in" filter="fade">
+                                      <p:cBhvr>
+                                        <p:cTn id="17" dur="500"/>
+                                        <p:tgtEl>
+                                          <p:spTgt spid="3">
+                                            <p:txEl>
+                                              <p:pRg st="2" end="2"/>
+                                            </p:txEl>
+                                          </p:spTgt>
+                                        </p:tgtEl>
+                                      </p:cBhvr>
+                                    </p:animEffect>
+                                  </p:childTnLst>
+                                </p:cTn>
+                              </p:par>
+                            </p:childTnLst>
+                          </p:cTn>
+                        </p:par>
+                      </p:childTnLst>
+                    </p:cTn>
+                  </p:par>
+                  <p:par>
+                    <p:cTn id="18" fill="hold">
+                      <p:stCondLst>
+                        <p:cond delay="indefinite"/>
+                      </p:stCondLst>
+                      <p:childTnLst>
+                        <p:par>
+                          <p:cTn id="19" fill="hold">
+                            <p:stCondLst>
+                              <p:cond delay="0"/>
+                            </p:stCondLst>
+                            <p:childTnLst>
+                              <p:par>
+                                <p:cTn id="20" presetID="10" presetClass="entr" presetSubtype="0" fill="hold" grpId="0" nodeType="clickEffect">
+                                  <p:stCondLst>
+                                    <p:cond delay="0"/>
+                                  </p:stCondLst>
+                                  <p:childTnLst>
+                                    <p:set>
+                                      <p:cBhvr>
+                                        <p:cTn id="21" dur="1" fill="hold">
+                                          <p:stCondLst>
+                                            <p:cond delay="0"/>
+                                          </p:stCondLst>
+                                        </p:cTn>
+                                        <p:tgtEl>
+                                          <p:spTgt spid="3">
+                                            <p:txEl>
+                                              <p:pRg st="3" end="3"/>
+                                            </p:txEl>
+                                          </p:spTgt>
+                                        </p:tgtEl>
+                                        <p:attrNameLst>
+                                          <p:attrName>style.visibility</p:attrName>
+                                        </p:attrNameLst>
+                                      </p:cBhvr>
+                                      <p:to>
+                                        <p:strVal val="visible"/>
+                                      </p:to>
+                                    </p:set>
+                                    <p:animEffect transition="in" filter="fade">
+                                      <p:cBhvr>
+                                        <p:cTn id="22" dur="500"/>
+                                        <p:tgtEl>
+                                          <p:spTgt spid="3">
+                                            <p:txEl>
+                                              <p:pRg st="3" end="3"/>
+                                            </p:txEl>
+                                          </p:spTgt>
+                                        </p:tgtEl>
+                                      </p:cBhvr>
+                                    </p:animEffect>
+                                  </p:childTnLst>
+                                </p:cTn>
+                              </p:par>
+                            </p:childTnLst>
+                          </p:cTn>
+                        </p:par>
+                      </p:childTnLst>
+                    </p:cTn>
+                  </p:par>
+                  <p:par>
+                    <p:cTn id="23" fill="hold">
+                      <p:stCondLst>
+                        <p:cond delay="indefinite"/>
+                      </p:stCondLst>
+                      <p:childTnLst>
+                        <p:par>
+                          <p:cTn id="24" fill="hold">
+                            <p:stCondLst>
+                              <p:cond delay="0"/>
+                            </p:stCondLst>
+                            <p:childTnLst>
+                              <p:par>
+                                <p:cTn id="25" presetID="10" presetClass="entr" presetSubtype="0" fill="hold" grpId="0" nodeType="clickEffect">
+                                  <p:stCondLst>
+                                    <p:cond delay="0"/>
+                                  </p:stCondLst>
+                                  <p:childTnLst>
+                                    <p:set>
+                                      <p:cBhvr>
+                                        <p:cTn id="26" dur="1" fill="hold">
+                                          <p:stCondLst>
+                                            <p:cond delay="0"/>
+                                          </p:stCondLst>
+                                        </p:cTn>
+                                        <p:tgtEl>
+                                          <p:spTgt spid="3">
+                                            <p:txEl>
+                                              <p:pRg st="4" end="4"/>
+                                            </p:txEl>
+                                          </p:spTgt>
+                                        </p:tgtEl>
+                                        <p:attrNameLst>
+                                          <p:attrName>style.visibility</p:attrName>
+                                        </p:attrNameLst>
+                                      </p:cBhvr>
+                                      <p:to>
+                                        <p:strVal val="visible"/>
+                                      </p:to>
+                                    </p:set>
+                                    <p:animEffect transition="in" filter="fade">
+                                      <p:cBhvr>
+                                        <p:cTn id="27" dur="500"/>
+                                        <p:tgtEl>
+                                          <p:spTgt spid="3">
+                                            <p:txEl>
+                                              <p:pRg st="4" end="4"/>
+                                            </p:txEl>
+                                          </p:spTgt>
+                                        </p:tgtEl>
+                                      </p:cBhvr>
+                                    </p:animEffect>
+                                  </p:childTnLst>
+                                </p:cTn>
+                              </p:par>
+                            </p:childTnLst>
+                          </p:cTn>
+                        </p:par>
+                      </p:childTnLst>
+                    </p:cTn>
+                  </p:par>
+                  <p:par>
+                    <p:cTn id="28" fill="hold">
+                      <p:stCondLst>
+                        <p:cond delay="indefinite"/>
+                      </p:stCondLst>
+                      <p:childTnLst>
+                        <p:par>
+                          <p:cTn id="29" fill="hold">
+                            <p:stCondLst>
+                              <p:cond delay="0"/>
+                            </p:stCondLst>
+                            <p:childTnLst>
+                              <p:par>
+                                <p:cTn id="30" presetID="10" presetClass="entr" presetSubtype="0" fill="hold" grpId="0" nodeType="clickEffect">
+                                  <p:stCondLst>
+                                    <p:cond delay="0"/>
+                                  </p:stCondLst>
+                                  <p:childTnLst>
+                                    <p:set>
+                                      <p:cBhvr>
+                                        <p:cTn id="31" dur="1" fill="hold">
+                                          <p:stCondLst>
+                                            <p:cond delay="0"/>
+                                          </p:stCondLst>
+                                        </p:cTn>
+                                        <p:tgtEl>
+                                          <p:spTgt spid="3">
+                                            <p:txEl>
+                                              <p:pRg st="5" end="5"/>
+                                            </p:txEl>
+                                          </p:spTgt>
+                                        </p:tgtEl>
+                                        <p:attrNameLst>
+                                          <p:attrName>style.visibility</p:attrName>
+                                        </p:attrNameLst>
+                                      </p:cBhvr>
+                                      <p:to>
+                                        <p:strVal val="visible"/>
+                                      </p:to>
+                                    </p:set>
+                                    <p:animEffect transition="in" filter="fade">
+                                      <p:cBhvr>
+                                        <p:cTn id="32" dur="500"/>
+                                        <p:tgtEl>
+                                          <p:spTgt spid="3">
+                                            <p:txEl>
+                                              <p:pRg st="5" end="5"/>
+                                            </p:txEl>
+                                          </p:spTgt>
+                                        </p:tgtEl>
+                                      </p:cBhvr>
+                                    </p:animEffect>
+                                  </p:childTnLst>
+                                </p:cTn>
+                              </p:par>
+                            </p:childTnLst>
+                          </p:cTn>
+                        </p:par>
+                      </p:childTnLst>
+                    </p:cTn>
+                  </p:par>
+                  <p:par>
+                    <p:cTn id="33" fill="hold">
+                      <p:stCondLst>
+                        <p:cond delay="indefinite"/>
+                      </p:stCondLst>
+                      <p:childTnLst>
+                        <p:par>
+                          <p:cTn id="34" fill="hold">
+                            <p:stCondLst>
+                              <p:cond delay="0"/>
+                            </p:stCondLst>
+                            <p:childTnLst>
+                              <p:par>
+                                <p:cTn id="35" presetID="10" presetClass="entr" presetSubtype="0" fill="hold" grpId="0" nodeType="clickEffect">
+                                  <p:stCondLst>
+                                    <p:cond delay="0"/>
+                                  </p:stCondLst>
+                                  <p:childTnLst>
+                                    <p:set>
+                                      <p:cBhvr>
+                                        <p:cTn id="36" dur="1" fill="hold">
+                                          <p:stCondLst>
+                                            <p:cond delay="0"/>
+                                          </p:stCondLst>
+                                        </p:cTn>
+                                        <p:tgtEl>
+                                          <p:spTgt spid="3">
+                                            <p:txEl>
+                                              <p:pRg st="6" end="6"/>
+                                            </p:txEl>
+                                          </p:spTgt>
+                                        </p:tgtEl>
+                                        <p:attrNameLst>
+                                          <p:attrName>style.visibility</p:attrName>
+                                        </p:attrNameLst>
+                                      </p:cBhvr>
+                                      <p:to>
+                                        <p:strVal val="visible"/>
+                                      </p:to>
+                                    </p:set>
+                                    <p:animEffect transition="in" filter="fade">
+                                      <p:cBhvr>
+                                        <p:cTn id="37" dur="500"/>
+                                        <p:tgtEl>
+                                          <p:spTgt spid="3">
+                                            <p:txEl>
+                                              <p:pRg st="6" end="6"/>
+                                            </p:txEl>
+                                          </p:spTgt>
+                                        </p:tgtEl>
+                                      </p:cBhvr>
+                                    </p:animEffect>
+                                  </p:childTnLst>
+                                </p:cTn>
+                              </p:par>
+                            </p:childTnLst>
+                          </p:cTn>
+                        </p:par>
+                      </p:childTnLst>
+                    </p:cTn>
+                  </p:par>
+                  <p:par>
+                    <p:cTn id="38" fill="hold">
+                      <p:stCondLst>
+                        <p:cond delay="indefinite"/>
+                      </p:stCondLst>
+                      <p:childTnLst>
+                        <p:par>
+                          <p:cTn id="39" fill="hold">
+                            <p:stCondLst>
+                              <p:cond delay="0"/>
+                            </p:stCondLst>
+                            <p:childTnLst>
+                              <p:par>
+                                <p:cTn id="40" presetID="10" presetClass="entr" presetSubtype="0" fill="hold" grpId="0" nodeType="clickEffect">
+                                  <p:stCondLst>
+                                    <p:cond delay="0"/>
+                                  </p:stCondLst>
+                                  <p:childTnLst>
+                                    <p:set>
+                                      <p:cBhvr>
+                                        <p:cTn id="41" dur="1" fill="hold">
+                                          <p:stCondLst>
+                                            <p:cond delay="0"/>
+                                          </p:stCondLst>
+                                        </p:cTn>
+                                        <p:tgtEl>
+                                          <p:spTgt spid="3">
+                                            <p:txEl>
+                                              <p:pRg st="7" end="7"/>
+                                            </p:txEl>
+                                          </p:spTgt>
+                                        </p:tgtEl>
+                                        <p:attrNameLst>
+                                          <p:attrName>style.visibility</p:attrName>
+                                        </p:attrNameLst>
+                                      </p:cBhvr>
+                                      <p:to>
+                                        <p:strVal val="visible"/>
+                                      </p:to>
+                                    </p:set>
+                                    <p:animEffect transition="in" filter="fade">
+                                      <p:cBhvr>
+                                        <p:cTn id="42" dur="500"/>
+                                        <p:tgtEl>
+                                          <p:spTgt spid="3">
+                                            <p:txEl>
+                                              <p:pRg st="7" end="7"/>
+                                            </p:txEl>
+                                          </p:spTgt>
+                                        </p:tgtEl>
+                                      </p:cBhvr>
+                                    </p:animEffect>
+                                  </p:childTnLst>
+                                </p:cTn>
+                              </p:par>
+                            </p:childTnLst>
+                          </p:cTn>
+                        </p:par>
+                      </p:childTnLst>
+                    </p:cTn>
+                  </p:par>
+                  <p:par>
+                    <p:cTn id="43" fill="hold">
+                      <p:stCondLst>
+                        <p:cond delay="indefinite"/>
+                      </p:stCondLst>
+                      <p:childTnLst>
+                        <p:par>
+                          <p:cTn id="44" fill="hold">
+                            <p:stCondLst>
+                              <p:cond delay="0"/>
+                            </p:stCondLst>
+                            <p:childTnLst>
+                              <p:par>
+                                <p:cTn id="45" presetID="10" presetClass="entr" presetSubtype="0" fill="hold" grpId="0" nodeType="clickEffect">
+                                  <p:stCondLst>
+                                    <p:cond delay="0"/>
+                                  </p:stCondLst>
+                                  <p:childTnLst>
+                                    <p:set>
+                                      <p:cBhvr>
+                                        <p:cTn id="46" dur="1" fill="hold">
+                                          <p:stCondLst>
+                                            <p:cond delay="0"/>
+                                          </p:stCondLst>
+                                        </p:cTn>
+                                        <p:tgtEl>
+                                          <p:spTgt spid="3">
+                                            <p:txEl>
+                                              <p:pRg st="8" end="8"/>
+                                            </p:txEl>
+                                          </p:spTgt>
+                                        </p:tgtEl>
+                                        <p:attrNameLst>
+                                          <p:attrName>style.visibility</p:attrName>
+                                        </p:attrNameLst>
+                                      </p:cBhvr>
+                                      <p:to>
+                                        <p:strVal val="visible"/>
+                                      </p:to>
+                                    </p:set>
+                                    <p:animEffect transition="in" filter="fade">
+                                      <p:cBhvr>
+                                        <p:cTn id="47" dur="500"/>
+                                        <p:tgtEl>
+                                          <p:spTgt spid="3">
+                                            <p:txEl>
+                                              <p:pRg st="8" end="8"/>
+                                            </p:txEl>
+                                          </p:spTgt>
+                                        </p:tgtEl>
+                                      </p:cBhvr>
+                                    </p:animEffect>
+                                  </p:childTnLst>
+                                </p:cTn>
+                              </p:par>
+                            </p:childTnLst>
+                          </p:cTn>
+                        </p:par>
+                      </p:childTnLst>
+                    </p:cTn>
+                  </p:par>
+                </p:childTnLst>
+              </p:cTn>
+              <p:prevCondLst>
+                <p:cond evt="onPrev" delay="0">
+                  <p:tgtEl>
+                    <p:sldTgt/>
+                  </p:tgtEl>
+                </p:cond>
+              </p:prevCondLst>
+              <p:nextCondLst>
+                <p:cond evt="onNext" delay="0">
+                  <p:tgtEl>
+                    <p:sldTgt/>
+                  </p:tgtEl>
+                </p:cond>
+              </p:nextCondLst>
+            </p:seq>
+          </p:childTnLst>
+        </p:cTn>
+      </p:par>
+    </p:tnLst>
+    <p:bldLst>
+      <p:bldP spid="3" grpId="0" build="p"/>
+    </p:bldLst>
+  </p:timing>
+</p:sld>
+</file>
+
 <file path=ppt/theme/theme1.xml><?xml version="1.0" encoding="utf-8"?>
 <a:theme xmlns:a="http://schemas.openxmlformats.org/drawingml/2006/main" name="Circuit">
   <a:themeElements>

</xml_diff>